<commit_message>
Added Roman Zavodskikh notes to class08
</commit_message>
<xml_diff>
--- a/talks/src/class08.pptx
+++ b/talks/src/class08.pptx
@@ -6,10 +6,10 @@
     <p:sldMasterId id="2147483660" r:id="rId2"/>
   </p:sldMasterIdLst>
   <p:notesMasterIdLst>
-    <p:notesMasterId r:id="rId34"/>
+    <p:notesMasterId r:id="rId35"/>
   </p:notesMasterIdLst>
   <p:handoutMasterIdLst>
-    <p:handoutMasterId r:id="rId35"/>
+    <p:handoutMasterId r:id="rId36"/>
   </p:handoutMasterIdLst>
   <p:sldIdLst>
     <p:sldId id="280" r:id="rId3"/>
@@ -39,10 +39,11 @@
     <p:sldId id="359" r:id="rId27"/>
     <p:sldId id="360" r:id="rId28"/>
     <p:sldId id="361" r:id="rId29"/>
-    <p:sldId id="362" r:id="rId30"/>
-    <p:sldId id="363" r:id="rId31"/>
-    <p:sldId id="364" r:id="rId32"/>
-    <p:sldId id="365" r:id="rId33"/>
+    <p:sldId id="366" r:id="rId30"/>
+    <p:sldId id="362" r:id="rId31"/>
+    <p:sldId id="363" r:id="rId32"/>
+    <p:sldId id="364" r:id="rId33"/>
+    <p:sldId id="365" r:id="rId34"/>
   </p:sldIdLst>
   <p:sldSz cx="12192000" cy="6858000"/>
   <p:notesSz cx="6858000" cy="9144000"/>
@@ -234,7 +235,7 @@
           <a:p>
             <a:fld id="{56C6788E-680A-49E5-BB93-D456A9D23A29}" type="datetimeFigureOut">
               <a:rPr lang="ru-RU" smtClean="0"/>
-              <a:t>25.11.2018</a:t>
+              <a:t>30.10.2019</a:t>
             </a:fld>
             <a:endParaRPr lang="ru-RU"/>
           </a:p>
@@ -403,7 +404,7 @@
           <a:p>
             <a:fld id="{C4DF4945-C160-4CD5-B124-49B9BE14C0AB}" type="datetimeFigureOut">
               <a:rPr lang="ru-RU" smtClean="0"/>
-              <a:t>25.11.2018</a:t>
+              <a:t>30.10.2019</a:t>
             </a:fld>
             <a:endParaRPr lang="ru-RU"/>
           </a:p>
@@ -2888,7 +2889,7 @@
     </p:spTree>
     <p:extLst>
       <p:ext uri="{BB962C8B-B14F-4D97-AF65-F5344CB8AC3E}">
-        <p14:creationId xmlns:p14="http://schemas.microsoft.com/office/powerpoint/2010/main" val="1958967329"/>
+        <p14:creationId xmlns:p14="http://schemas.microsoft.com/office/powerpoint/2010/main" val="2085951328"/>
       </p:ext>
     </p:extLst>
   </p:cSld>
@@ -2994,7 +2995,7 @@
     </p:spTree>
     <p:extLst>
       <p:ext uri="{BB962C8B-B14F-4D97-AF65-F5344CB8AC3E}">
-        <p14:creationId xmlns:p14="http://schemas.microsoft.com/office/powerpoint/2010/main" val="2528359160"/>
+        <p14:creationId xmlns:p14="http://schemas.microsoft.com/office/powerpoint/2010/main" val="1958967329"/>
       </p:ext>
     </p:extLst>
   </p:cSld>
@@ -3206,7 +3207,7 @@
     </p:spTree>
     <p:extLst>
       <p:ext uri="{BB962C8B-B14F-4D97-AF65-F5344CB8AC3E}">
-        <p14:creationId xmlns:p14="http://schemas.microsoft.com/office/powerpoint/2010/main" val="434498530"/>
+        <p14:creationId xmlns:p14="http://schemas.microsoft.com/office/powerpoint/2010/main" val="2528359160"/>
       </p:ext>
     </p:extLst>
   </p:cSld>
@@ -3282,6 +3283,112 @@
             <a:fld id="{7F33120B-582B-4354-977D-A474A534F6B9}" type="slidenum">
               <a:rPr lang="ru-RU" smtClean="0"/>
               <a:t>31</a:t>
+            </a:fld>
+            <a:endParaRPr lang="ru-RU"/>
+          </a:p>
+        </p:txBody>
+      </p:sp>
+      <p:sp>
+        <p:nvSpPr>
+          <p:cNvPr id="5" name="Header Placeholder 4"/>
+          <p:cNvSpPr>
+            <a:spLocks noGrp="1"/>
+          </p:cNvSpPr>
+          <p:nvPr>
+            <p:ph type="hdr" sz="quarter" idx="11"/>
+          </p:nvPr>
+        </p:nvSpPr>
+        <p:spPr/>
+        <p:txBody>
+          <a:bodyPr/>
+          <a:lstStyle/>
+          <a:p>
+            <a:r>
+              <a:rPr lang="ru-RU"/>
+              <a:t>Основы построения файловых систем</a:t>
+            </a:r>
+          </a:p>
+        </p:txBody>
+      </p:sp>
+    </p:spTree>
+    <p:extLst>
+      <p:ext uri="{BB962C8B-B14F-4D97-AF65-F5344CB8AC3E}">
+        <p14:creationId xmlns:p14="http://schemas.microsoft.com/office/powerpoint/2010/main" val="434498530"/>
+      </p:ext>
+    </p:extLst>
+  </p:cSld>
+  <p:clrMapOvr>
+    <a:masterClrMapping/>
+  </p:clrMapOvr>
+</p:notes>
+</file>
+
+<file path=ppt/notesSlides/notesSlide32.xml><?xml version="1.0" encoding="utf-8"?>
+<p:notes xmlns:a="http://schemas.openxmlformats.org/drawingml/2006/main" xmlns:r="http://schemas.openxmlformats.org/officeDocument/2006/relationships" xmlns:p="http://schemas.openxmlformats.org/presentationml/2006/main">
+  <p:cSld>
+    <p:spTree>
+      <p:nvGrpSpPr>
+        <p:cNvPr id="1" name=""/>
+        <p:cNvGrpSpPr/>
+        <p:nvPr/>
+      </p:nvGrpSpPr>
+      <p:grpSpPr>
+        <a:xfrm>
+          <a:off x="0" y="0"/>
+          <a:ext cx="0" cy="0"/>
+          <a:chOff x="0" y="0"/>
+          <a:chExt cx="0" cy="0"/>
+        </a:xfrm>
+      </p:grpSpPr>
+      <p:sp>
+        <p:nvSpPr>
+          <p:cNvPr id="2" name="Slide Image Placeholder 1"/>
+          <p:cNvSpPr>
+            <a:spLocks noGrp="1" noRot="1" noChangeAspect="1"/>
+          </p:cNvSpPr>
+          <p:nvPr>
+            <p:ph type="sldImg"/>
+          </p:nvPr>
+        </p:nvSpPr>
+        <p:spPr/>
+      </p:sp>
+      <p:sp>
+        <p:nvSpPr>
+          <p:cNvPr id="3" name="Notes Placeholder 2"/>
+          <p:cNvSpPr>
+            <a:spLocks noGrp="1"/>
+          </p:cNvSpPr>
+          <p:nvPr>
+            <p:ph type="body" idx="1"/>
+          </p:nvPr>
+        </p:nvSpPr>
+        <p:spPr/>
+        <p:txBody>
+          <a:bodyPr/>
+          <a:lstStyle/>
+          <a:p>
+            <a:endParaRPr lang="ru-RU"/>
+          </a:p>
+        </p:txBody>
+      </p:sp>
+      <p:sp>
+        <p:nvSpPr>
+          <p:cNvPr id="4" name="Slide Number Placeholder 3"/>
+          <p:cNvSpPr>
+            <a:spLocks noGrp="1"/>
+          </p:cNvSpPr>
+          <p:nvPr>
+            <p:ph type="sldNum" sz="quarter" idx="10"/>
+          </p:nvPr>
+        </p:nvSpPr>
+        <p:spPr/>
+        <p:txBody>
+          <a:bodyPr/>
+          <a:lstStyle/>
+          <a:p>
+            <a:fld id="{7F33120B-582B-4354-977D-A474A534F6B9}" type="slidenum">
+              <a:rPr lang="ru-RU" smtClean="0"/>
+              <a:t>32</a:t>
             </a:fld>
             <a:endParaRPr lang="ru-RU"/>
           </a:p>
@@ -4089,7 +4196,7 @@
           <a:p>
             <a:fld id="{12C63722-5D9F-4E99-9720-9B6A0C7BB1C9}" type="datetimeFigureOut">
               <a:rPr lang="ru-RU" smtClean="0"/>
-              <a:t>25.11.2018</a:t>
+              <a:t>30.10.2019</a:t>
             </a:fld>
             <a:endParaRPr lang="ru-RU"/>
           </a:p>
@@ -4259,7 +4366,7 @@
           <a:p>
             <a:fld id="{12C63722-5D9F-4E99-9720-9B6A0C7BB1C9}" type="datetimeFigureOut">
               <a:rPr lang="ru-RU" smtClean="0"/>
-              <a:t>25.11.2018</a:t>
+              <a:t>30.10.2019</a:t>
             </a:fld>
             <a:endParaRPr lang="ru-RU"/>
           </a:p>
@@ -4439,7 +4546,7 @@
           <a:p>
             <a:fld id="{12C63722-5D9F-4E99-9720-9B6A0C7BB1C9}" type="datetimeFigureOut">
               <a:rPr lang="ru-RU" smtClean="0"/>
-              <a:t>25.11.2018</a:t>
+              <a:t>30.10.2019</a:t>
             </a:fld>
             <a:endParaRPr lang="ru-RU"/>
           </a:p>
@@ -4631,7 +4738,7 @@
           <a:p>
             <a:fld id="{8C218C88-2408-4CFC-B25C-07450930B282}" type="datetimeFigureOut">
               <a:rPr lang="ru-RU" smtClean="0"/>
-              <a:t>25.11.2018</a:t>
+              <a:t>30.10.2019</a:t>
             </a:fld>
             <a:endParaRPr lang="ru-RU"/>
           </a:p>
@@ -4801,7 +4908,7 @@
           <a:p>
             <a:fld id="{8C218C88-2408-4CFC-B25C-07450930B282}" type="datetimeFigureOut">
               <a:rPr lang="ru-RU" smtClean="0"/>
-              <a:t>25.11.2018</a:t>
+              <a:t>30.10.2019</a:t>
             </a:fld>
             <a:endParaRPr lang="ru-RU"/>
           </a:p>
@@ -5047,7 +5154,7 @@
           <a:p>
             <a:fld id="{8C218C88-2408-4CFC-B25C-07450930B282}" type="datetimeFigureOut">
               <a:rPr lang="ru-RU" smtClean="0"/>
-              <a:t>25.11.2018</a:t>
+              <a:t>30.10.2019</a:t>
             </a:fld>
             <a:endParaRPr lang="ru-RU"/>
           </a:p>
@@ -5279,7 +5386,7 @@
           <a:p>
             <a:fld id="{8C218C88-2408-4CFC-B25C-07450930B282}" type="datetimeFigureOut">
               <a:rPr lang="ru-RU" smtClean="0"/>
-              <a:t>25.11.2018</a:t>
+              <a:t>30.10.2019</a:t>
             </a:fld>
             <a:endParaRPr lang="ru-RU"/>
           </a:p>
@@ -5646,7 +5753,7 @@
           <a:p>
             <a:fld id="{8C218C88-2408-4CFC-B25C-07450930B282}" type="datetimeFigureOut">
               <a:rPr lang="ru-RU" smtClean="0"/>
-              <a:t>25.11.2018</a:t>
+              <a:t>30.10.2019</a:t>
             </a:fld>
             <a:endParaRPr lang="ru-RU"/>
           </a:p>
@@ -5764,7 +5871,7 @@
           <a:p>
             <a:fld id="{8C218C88-2408-4CFC-B25C-07450930B282}" type="datetimeFigureOut">
               <a:rPr lang="ru-RU" smtClean="0"/>
-              <a:t>25.11.2018</a:t>
+              <a:t>30.10.2019</a:t>
             </a:fld>
             <a:endParaRPr lang="ru-RU"/>
           </a:p>
@@ -5859,7 +5966,7 @@
           <a:p>
             <a:fld id="{8C218C88-2408-4CFC-B25C-07450930B282}" type="datetimeFigureOut">
               <a:rPr lang="ru-RU" smtClean="0"/>
-              <a:t>25.11.2018</a:t>
+              <a:t>30.10.2019</a:t>
             </a:fld>
             <a:endParaRPr lang="ru-RU"/>
           </a:p>
@@ -6136,7 +6243,7 @@
           <a:p>
             <a:fld id="{8C218C88-2408-4CFC-B25C-07450930B282}" type="datetimeFigureOut">
               <a:rPr lang="ru-RU" smtClean="0"/>
-              <a:t>25.11.2018</a:t>
+              <a:t>30.10.2019</a:t>
             </a:fld>
             <a:endParaRPr lang="ru-RU"/>
           </a:p>
@@ -6306,7 +6413,7 @@
           <a:p>
             <a:fld id="{12C63722-5D9F-4E99-9720-9B6A0C7BB1C9}" type="datetimeFigureOut">
               <a:rPr lang="ru-RU" smtClean="0"/>
-              <a:t>25.11.2018</a:t>
+              <a:t>30.10.2019</a:t>
             </a:fld>
             <a:endParaRPr lang="ru-RU"/>
           </a:p>
@@ -6559,7 +6666,7 @@
           <a:p>
             <a:fld id="{8C218C88-2408-4CFC-B25C-07450930B282}" type="datetimeFigureOut">
               <a:rPr lang="ru-RU" smtClean="0"/>
-              <a:t>25.11.2018</a:t>
+              <a:t>30.10.2019</a:t>
             </a:fld>
             <a:endParaRPr lang="ru-RU"/>
           </a:p>
@@ -6729,7 +6836,7 @@
           <a:p>
             <a:fld id="{8C218C88-2408-4CFC-B25C-07450930B282}" type="datetimeFigureOut">
               <a:rPr lang="ru-RU" smtClean="0"/>
-              <a:t>25.11.2018</a:t>
+              <a:t>30.10.2019</a:t>
             </a:fld>
             <a:endParaRPr lang="ru-RU"/>
           </a:p>
@@ -6909,7 +7016,7 @@
           <a:p>
             <a:fld id="{8C218C88-2408-4CFC-B25C-07450930B282}" type="datetimeFigureOut">
               <a:rPr lang="ru-RU" smtClean="0"/>
-              <a:t>25.11.2018</a:t>
+              <a:t>30.10.2019</a:t>
             </a:fld>
             <a:endParaRPr lang="ru-RU"/>
           </a:p>
@@ -7155,7 +7262,7 @@
           <a:p>
             <a:fld id="{12C63722-5D9F-4E99-9720-9B6A0C7BB1C9}" type="datetimeFigureOut">
               <a:rPr lang="ru-RU" smtClean="0"/>
-              <a:t>25.11.2018</a:t>
+              <a:t>30.10.2019</a:t>
             </a:fld>
             <a:endParaRPr lang="ru-RU"/>
           </a:p>
@@ -7395,7 +7502,7 @@
           <a:p>
             <a:fld id="{12C63722-5D9F-4E99-9720-9B6A0C7BB1C9}" type="datetimeFigureOut">
               <a:rPr lang="ru-RU" smtClean="0"/>
-              <a:t>25.11.2018</a:t>
+              <a:t>30.10.2019</a:t>
             </a:fld>
             <a:endParaRPr lang="ru-RU"/>
           </a:p>
@@ -7762,7 +7869,7 @@
           <a:p>
             <a:fld id="{12C63722-5D9F-4E99-9720-9B6A0C7BB1C9}" type="datetimeFigureOut">
               <a:rPr lang="ru-RU" smtClean="0"/>
-              <a:t>25.11.2018</a:t>
+              <a:t>30.10.2019</a:t>
             </a:fld>
             <a:endParaRPr lang="ru-RU"/>
           </a:p>
@@ -7880,7 +7987,7 @@
           <a:p>
             <a:fld id="{12C63722-5D9F-4E99-9720-9B6A0C7BB1C9}" type="datetimeFigureOut">
               <a:rPr lang="ru-RU" smtClean="0"/>
-              <a:t>25.11.2018</a:t>
+              <a:t>30.10.2019</a:t>
             </a:fld>
             <a:endParaRPr lang="ru-RU"/>
           </a:p>
@@ -7975,7 +8082,7 @@
           <a:p>
             <a:fld id="{12C63722-5D9F-4E99-9720-9B6A0C7BB1C9}" type="datetimeFigureOut">
               <a:rPr lang="ru-RU" smtClean="0"/>
-              <a:t>25.11.2018</a:t>
+              <a:t>30.10.2019</a:t>
             </a:fld>
             <a:endParaRPr lang="ru-RU"/>
           </a:p>
@@ -8252,7 +8359,7 @@
           <a:p>
             <a:fld id="{12C63722-5D9F-4E99-9720-9B6A0C7BB1C9}" type="datetimeFigureOut">
               <a:rPr lang="ru-RU" smtClean="0"/>
-              <a:t>25.11.2018</a:t>
+              <a:t>30.10.2019</a:t>
             </a:fld>
             <a:endParaRPr lang="ru-RU"/>
           </a:p>
@@ -8505,7 +8612,7 @@
           <a:p>
             <a:fld id="{12C63722-5D9F-4E99-9720-9B6A0C7BB1C9}" type="datetimeFigureOut">
               <a:rPr lang="ru-RU" smtClean="0"/>
-              <a:t>25.11.2018</a:t>
+              <a:t>30.10.2019</a:t>
             </a:fld>
             <a:endParaRPr lang="ru-RU"/>
           </a:p>
@@ -8718,7 +8825,7 @@
           <a:p>
             <a:fld id="{12C63722-5D9F-4E99-9720-9B6A0C7BB1C9}" type="datetimeFigureOut">
               <a:rPr lang="ru-RU" smtClean="0"/>
-              <a:t>25.11.2018</a:t>
+              <a:t>30.10.2019</a:t>
             </a:fld>
             <a:endParaRPr lang="ru-RU"/>
           </a:p>
@@ -9258,7 +9365,7 @@
           <a:p>
             <a:fld id="{8C218C88-2408-4CFC-B25C-07450930B282}" type="datetimeFigureOut">
               <a:rPr lang="ru-RU" smtClean="0"/>
-              <a:t>25.11.2018</a:t>
+              <a:t>30.10.2019</a:t>
             </a:fld>
             <a:endParaRPr lang="ru-RU"/>
           </a:p>
@@ -9899,6 +10006,13 @@
   <p:clrMapOvr>
     <a:masterClrMapping/>
   </p:clrMapOvr>
+  <p:timing>
+    <p:tnLst>
+      <p:par>
+        <p:cTn id="1" dur="indefinite" restart="never" nodeType="tmRoot"/>
+      </p:par>
+    </p:tnLst>
+  </p:timing>
 </p:sld>
 </file>
 
@@ -10495,6 +10609,13 @@
   <p:clrMapOvr>
     <a:masterClrMapping/>
   </p:clrMapOvr>
+  <p:timing>
+    <p:tnLst>
+      <p:par>
+        <p:cTn id="1" dur="indefinite" restart="never" nodeType="tmRoot"/>
+      </p:par>
+    </p:tnLst>
+  </p:timing>
 </p:sld>
 </file>
 
@@ -11332,6 +11453,13 @@
   <p:clrMapOvr>
     <a:masterClrMapping/>
   </p:clrMapOvr>
+  <p:timing>
+    <p:tnLst>
+      <p:par>
+        <p:cTn id="1" dur="indefinite" restart="never" nodeType="tmRoot"/>
+      </p:par>
+    </p:tnLst>
+  </p:timing>
 </p:sld>
 </file>
 
@@ -12170,6 +12298,13 @@
   <p:clrMapOvr>
     <a:masterClrMapping/>
   </p:clrMapOvr>
+  <p:timing>
+    <p:tnLst>
+      <p:par>
+        <p:cTn id="1" dur="indefinite" restart="never" nodeType="tmRoot"/>
+      </p:par>
+    </p:tnLst>
+  </p:timing>
 </p:sld>
 </file>
 
@@ -12483,6 +12618,13 @@
   <p:clrMapOvr>
     <a:masterClrMapping/>
   </p:clrMapOvr>
+  <p:timing>
+    <p:tnLst>
+      <p:par>
+        <p:cTn id="1" dur="indefinite" restart="never" nodeType="tmRoot"/>
+      </p:par>
+    </p:tnLst>
+  </p:timing>
 </p:sld>
 </file>
 
@@ -12970,6 +13112,13 @@
   <p:clrMapOvr>
     <a:masterClrMapping/>
   </p:clrMapOvr>
+  <p:timing>
+    <p:tnLst>
+      <p:par>
+        <p:cTn id="1" dur="indefinite" restart="never" nodeType="tmRoot"/>
+      </p:par>
+    </p:tnLst>
+  </p:timing>
 </p:sld>
 </file>
 
@@ -13453,6 +13602,13 @@
   <p:clrMapOvr>
     <a:masterClrMapping/>
   </p:clrMapOvr>
+  <p:timing>
+    <p:tnLst>
+      <p:par>
+        <p:cTn id="1" dur="indefinite" restart="never" nodeType="tmRoot"/>
+      </p:par>
+    </p:tnLst>
+  </p:timing>
 </p:sld>
 </file>
 
@@ -13743,6 +13899,14 @@
                         </a:rPr>
                         <a:t>тоже должен обеспечивать линейные записи, он не должен фрагментироваться.</a:t>
                       </a:r>
+                      <a:r>
+                        <a:rPr lang="en-US" dirty="0">
+                          <a:solidFill>
+                            <a:schemeClr val="tx1"/>
+                          </a:solidFill>
+                        </a:rPr>
+                        <a:t/>
+                      </a:r>
                       <a:br>
                         <a:rPr lang="en-US" dirty="0">
                           <a:solidFill>
@@ -13750,6 +13914,14 @@
                           </a:solidFill>
                         </a:rPr>
                       </a:br>
+                      <a:r>
+                        <a:rPr lang="en-US" dirty="0">
+                          <a:solidFill>
+                            <a:schemeClr val="tx1"/>
+                          </a:solidFill>
+                        </a:rPr>
+                        <a:t/>
+                      </a:r>
                       <a:br>
                         <a:rPr lang="en-US" dirty="0">
                           <a:solidFill>
@@ -13765,6 +13937,14 @@
                         </a:rPr>
                         <a:t>Рассмотрим такой пример:</a:t>
                       </a:r>
+                      <a:r>
+                        <a:rPr lang="en-US" dirty="0">
+                          <a:solidFill>
+                            <a:schemeClr val="tx1"/>
+                          </a:solidFill>
+                        </a:rPr>
+                        <a:t/>
+                      </a:r>
                       <a:br>
                         <a:rPr lang="en-US" dirty="0">
                           <a:solidFill>
@@ -13772,6 +13952,14 @@
                           </a:solidFill>
                         </a:rPr>
                       </a:br>
+                      <a:r>
+                        <a:rPr lang="en-US" dirty="0">
+                          <a:solidFill>
+                            <a:schemeClr val="tx1"/>
+                          </a:solidFill>
+                        </a:rPr>
+                        <a:t/>
+                      </a:r>
                       <a:br>
                         <a:rPr lang="en-US" dirty="0">
                           <a:solidFill>
@@ -14387,6 +14575,13 @@
   <p:clrMapOvr>
     <a:masterClrMapping/>
   </p:clrMapOvr>
+  <p:timing>
+    <p:tnLst>
+      <p:par>
+        <p:cTn id="1" dur="indefinite" restart="never" nodeType="tmRoot"/>
+      </p:par>
+    </p:tnLst>
+  </p:timing>
 </p:sld>
 </file>
 
@@ -14677,6 +14872,14 @@
                         </a:rPr>
                         <a:t>тоже должен обеспечивать линейные записи, он не должен фрагментироваться.</a:t>
                       </a:r>
+                      <a:r>
+                        <a:rPr lang="en-US" dirty="0">
+                          <a:solidFill>
+                            <a:schemeClr val="tx1"/>
+                          </a:solidFill>
+                        </a:rPr>
+                        <a:t/>
+                      </a:r>
                       <a:br>
                         <a:rPr lang="en-US" dirty="0">
                           <a:solidFill>
@@ -14684,6 +14887,14 @@
                           </a:solidFill>
                         </a:rPr>
                       </a:br>
+                      <a:r>
+                        <a:rPr lang="en-US" dirty="0">
+                          <a:solidFill>
+                            <a:schemeClr val="tx1"/>
+                          </a:solidFill>
+                        </a:rPr>
+                        <a:t/>
+                      </a:r>
                       <a:br>
                         <a:rPr lang="en-US" dirty="0">
                           <a:solidFill>
@@ -14699,6 +14910,14 @@
                         </a:rPr>
                         <a:t>Рассмотрим такой пример:</a:t>
                       </a:r>
+                      <a:r>
+                        <a:rPr lang="en-US" dirty="0">
+                          <a:solidFill>
+                            <a:schemeClr val="tx1"/>
+                          </a:solidFill>
+                        </a:rPr>
+                        <a:t/>
+                      </a:r>
                       <a:br>
                         <a:rPr lang="en-US" dirty="0">
                           <a:solidFill>
@@ -14706,6 +14925,14 @@
                           </a:solidFill>
                         </a:rPr>
                       </a:br>
+                      <a:r>
+                        <a:rPr lang="en-US" dirty="0">
+                          <a:solidFill>
+                            <a:schemeClr val="tx1"/>
+                          </a:solidFill>
+                        </a:rPr>
+                        <a:t/>
+                      </a:r>
                       <a:br>
                         <a:rPr lang="en-US" dirty="0">
                           <a:solidFill>
@@ -15255,6 +15482,13 @@
   <p:clrMapOvr>
     <a:masterClrMapping/>
   </p:clrMapOvr>
+  <p:timing>
+    <p:tnLst>
+      <p:par>
+        <p:cTn id="1" dur="indefinite" restart="never" nodeType="tmRoot"/>
+      </p:par>
+    </p:tnLst>
+  </p:timing>
 </p:sld>
 </file>
 
@@ -15545,6 +15779,14 @@
                         </a:rPr>
                         <a:t>тоже должен обеспечивать линейные записи, он не должен фрагментироваться.</a:t>
                       </a:r>
+                      <a:r>
+                        <a:rPr lang="en-US" dirty="0">
+                          <a:solidFill>
+                            <a:schemeClr val="tx1"/>
+                          </a:solidFill>
+                        </a:rPr>
+                        <a:t/>
+                      </a:r>
                       <a:br>
                         <a:rPr lang="en-US" dirty="0">
                           <a:solidFill>
@@ -15552,6 +15794,14 @@
                           </a:solidFill>
                         </a:rPr>
                       </a:br>
+                      <a:r>
+                        <a:rPr lang="en-US" dirty="0">
+                          <a:solidFill>
+                            <a:schemeClr val="tx1"/>
+                          </a:solidFill>
+                        </a:rPr>
+                        <a:t/>
+                      </a:r>
                       <a:br>
                         <a:rPr lang="en-US" dirty="0">
                           <a:solidFill>
@@ -15567,6 +15817,14 @@
                         </a:rPr>
                         <a:t>Рассмотрим такой пример:</a:t>
                       </a:r>
+                      <a:r>
+                        <a:rPr lang="en-US" dirty="0">
+                          <a:solidFill>
+                            <a:schemeClr val="tx1"/>
+                          </a:solidFill>
+                        </a:rPr>
+                        <a:t/>
+                      </a:r>
                       <a:br>
                         <a:rPr lang="en-US" dirty="0">
                           <a:solidFill>
@@ -15574,6 +15832,14 @@
                           </a:solidFill>
                         </a:rPr>
                       </a:br>
+                      <a:r>
+                        <a:rPr lang="en-US" dirty="0">
+                          <a:solidFill>
+                            <a:schemeClr val="tx1"/>
+                          </a:solidFill>
+                        </a:rPr>
+                        <a:t/>
+                      </a:r>
                       <a:br>
                         <a:rPr lang="en-US" dirty="0">
                           <a:solidFill>
@@ -16300,6 +16566,13 @@
   <p:clrMapOvr>
     <a:masterClrMapping/>
   </p:clrMapOvr>
+  <p:timing>
+    <p:tnLst>
+      <p:par>
+        <p:cTn id="1" dur="indefinite" restart="never" nodeType="tmRoot"/>
+      </p:par>
+    </p:tnLst>
+  </p:timing>
 </p:sld>
 </file>
 
@@ -16590,6 +16863,14 @@
                         </a:rPr>
                         <a:t>тоже должен обеспечивать линейные записи, он не должен фрагментироваться.</a:t>
                       </a:r>
+                      <a:r>
+                        <a:rPr lang="en-US" dirty="0">
+                          <a:solidFill>
+                            <a:schemeClr val="tx1"/>
+                          </a:solidFill>
+                        </a:rPr>
+                        <a:t/>
+                      </a:r>
                       <a:br>
                         <a:rPr lang="en-US" dirty="0">
                           <a:solidFill>
@@ -16597,6 +16878,14 @@
                           </a:solidFill>
                         </a:rPr>
                       </a:br>
+                      <a:r>
+                        <a:rPr lang="en-US" dirty="0">
+                          <a:solidFill>
+                            <a:schemeClr val="tx1"/>
+                          </a:solidFill>
+                        </a:rPr>
+                        <a:t/>
+                      </a:r>
                       <a:br>
                         <a:rPr lang="en-US" dirty="0">
                           <a:solidFill>
@@ -16612,6 +16901,14 @@
                         </a:rPr>
                         <a:t>Рассмотрим такой пример:</a:t>
                       </a:r>
+                      <a:r>
+                        <a:rPr lang="en-US" dirty="0">
+                          <a:solidFill>
+                            <a:schemeClr val="tx1"/>
+                          </a:solidFill>
+                        </a:rPr>
+                        <a:t/>
+                      </a:r>
                       <a:br>
                         <a:rPr lang="en-US" dirty="0">
                           <a:solidFill>
@@ -16619,6 +16916,14 @@
                           </a:solidFill>
                         </a:rPr>
                       </a:br>
+                      <a:r>
+                        <a:rPr lang="en-US" dirty="0">
+                          <a:solidFill>
+                            <a:schemeClr val="tx1"/>
+                          </a:solidFill>
+                        </a:rPr>
+                        <a:t/>
+                      </a:r>
                       <a:br>
                         <a:rPr lang="en-US" dirty="0">
                           <a:solidFill>
@@ -16626,6 +16931,14 @@
                           </a:solidFill>
                         </a:rPr>
                       </a:br>
+                      <a:r>
+                        <a:rPr lang="en-US" dirty="0">
+                          <a:solidFill>
+                            <a:schemeClr val="tx1"/>
+                          </a:solidFill>
+                        </a:rPr>
+                        <a:t/>
+                      </a:r>
                       <a:br>
                         <a:rPr lang="en-US" dirty="0">
                           <a:solidFill>
@@ -16633,6 +16946,14 @@
                           </a:solidFill>
                         </a:rPr>
                       </a:br>
+                      <a:r>
+                        <a:rPr lang="en-US" dirty="0">
+                          <a:solidFill>
+                            <a:schemeClr val="tx1"/>
+                          </a:solidFill>
+                        </a:rPr>
+                        <a:t/>
+                      </a:r>
                       <a:br>
                         <a:rPr lang="en-US" dirty="0">
                           <a:solidFill>
@@ -16640,6 +16961,14 @@
                           </a:solidFill>
                         </a:rPr>
                       </a:br>
+                      <a:r>
+                        <a:rPr lang="en-US" dirty="0">
+                          <a:solidFill>
+                            <a:schemeClr val="tx1"/>
+                          </a:solidFill>
+                        </a:rPr>
+                        <a:t/>
+                      </a:r>
                       <a:br>
                         <a:rPr lang="en-US" dirty="0">
                           <a:solidFill>
@@ -16647,6 +16976,14 @@
                           </a:solidFill>
                         </a:rPr>
                       </a:br>
+                      <a:r>
+                        <a:rPr lang="en-US" dirty="0">
+                          <a:solidFill>
+                            <a:schemeClr val="tx1"/>
+                          </a:solidFill>
+                        </a:rPr>
+                        <a:t/>
+                      </a:r>
                       <a:br>
                         <a:rPr lang="en-US" dirty="0">
                           <a:solidFill>
@@ -16654,6 +16991,14 @@
                           </a:solidFill>
                         </a:rPr>
                       </a:br>
+                      <a:r>
+                        <a:rPr lang="en-US" dirty="0">
+                          <a:solidFill>
+                            <a:schemeClr val="tx1"/>
+                          </a:solidFill>
+                        </a:rPr>
+                        <a:t/>
+                      </a:r>
                       <a:br>
                         <a:rPr lang="en-US" dirty="0">
                           <a:solidFill>
@@ -16661,6 +17006,14 @@
                           </a:solidFill>
                         </a:rPr>
                       </a:br>
+                      <a:r>
+                        <a:rPr lang="en-US" dirty="0">
+                          <a:solidFill>
+                            <a:schemeClr val="tx1"/>
+                          </a:solidFill>
+                        </a:rPr>
+                        <a:t/>
+                      </a:r>
                       <a:br>
                         <a:rPr lang="en-US" dirty="0">
                           <a:solidFill>
@@ -16668,6 +17021,14 @@
                           </a:solidFill>
                         </a:rPr>
                       </a:br>
+                      <a:r>
+                        <a:rPr lang="en-US" dirty="0">
+                          <a:solidFill>
+                            <a:schemeClr val="tx1"/>
+                          </a:solidFill>
+                        </a:rPr>
+                        <a:t/>
+                      </a:r>
                       <a:br>
                         <a:rPr lang="en-US" dirty="0">
                           <a:solidFill>
@@ -16723,6 +17084,14 @@
                         </a:rPr>
                         <a:t>пришлось записать в три области на диске, не идущие подряд.</a:t>
                       </a:r>
+                      <a:r>
+                        <a:rPr lang="en-US" dirty="0">
+                          <a:solidFill>
+                            <a:schemeClr val="tx1"/>
+                          </a:solidFill>
+                        </a:rPr>
+                        <a:t/>
+                      </a:r>
                       <a:br>
                         <a:rPr lang="en-US" dirty="0">
                           <a:solidFill>
@@ -16730,6 +17099,14 @@
                           </a:solidFill>
                         </a:rPr>
                       </a:br>
+                      <a:r>
+                        <a:rPr lang="en-US" dirty="0">
+                          <a:solidFill>
+                            <a:schemeClr val="tx1"/>
+                          </a:solidFill>
+                        </a:rPr>
+                        <a:t/>
+                      </a:r>
                       <a:br>
                         <a:rPr lang="en-US" dirty="0">
                           <a:solidFill>
@@ -17387,6 +17764,13 @@
   <p:clrMapOvr>
     <a:masterClrMapping/>
   </p:clrMapOvr>
+  <p:timing>
+    <p:tnLst>
+      <p:par>
+        <p:cTn id="1" dur="indefinite" restart="never" nodeType="tmRoot"/>
+      </p:par>
+    </p:tnLst>
+  </p:timing>
 </p:sld>
 </file>
 
@@ -17677,6 +18061,13 @@
   <p:clrMapOvr>
     <a:masterClrMapping/>
   </p:clrMapOvr>
+  <p:timing>
+    <p:tnLst>
+      <p:par>
+        <p:cTn id="1" dur="indefinite" restart="never" nodeType="tmRoot"/>
+      </p:par>
+    </p:tnLst>
+  </p:timing>
 </p:sld>
 </file>
 
@@ -18222,6 +18613,13 @@
   <p:clrMapOvr>
     <a:masterClrMapping/>
   </p:clrMapOvr>
+  <p:timing>
+    <p:tnLst>
+      <p:par>
+        <p:cTn id="1" dur="indefinite" restart="never" nodeType="tmRoot"/>
+      </p:par>
+    </p:tnLst>
+  </p:timing>
 </p:sld>
 </file>
 
@@ -18710,6 +19108,13 @@
   <p:clrMapOvr>
     <a:masterClrMapping/>
   </p:clrMapOvr>
+  <p:timing>
+    <p:tnLst>
+      <p:par>
+        <p:cTn id="1" dur="indefinite" restart="never" nodeType="tmRoot"/>
+      </p:par>
+    </p:tnLst>
+  </p:timing>
 </p:sld>
 </file>
 
@@ -19038,6 +19443,14 @@
                         </a:rPr>
                         <a:t>Как обрабатывать удаление файлов, которые короче одного сегмента журнала?</a:t>
                       </a:r>
+                      <a:r>
+                        <a:rPr lang="en-US" dirty="0">
+                          <a:solidFill>
+                            <a:schemeClr val="tx1"/>
+                          </a:solidFill>
+                        </a:rPr>
+                        <a:t/>
+                      </a:r>
                       <a:br>
                         <a:rPr lang="en-US" dirty="0">
                           <a:solidFill>
@@ -19045,6 +19458,14 @@
                           </a:solidFill>
                         </a:rPr>
                       </a:br>
+                      <a:r>
+                        <a:rPr lang="en-US" dirty="0">
+                          <a:solidFill>
+                            <a:schemeClr val="tx1"/>
+                          </a:solidFill>
+                        </a:rPr>
+                        <a:t/>
+                      </a:r>
                       <a:br>
                         <a:rPr lang="en-US" dirty="0">
                           <a:solidFill>
@@ -19060,6 +19481,14 @@
                         </a:rPr>
                         <a:t>Рассмотрим такой пример:</a:t>
                       </a:r>
+                      <a:r>
+                        <a:rPr lang="en-US" dirty="0">
+                          <a:solidFill>
+                            <a:schemeClr val="tx1"/>
+                          </a:solidFill>
+                        </a:rPr>
+                        <a:t/>
+                      </a:r>
                       <a:br>
                         <a:rPr lang="en-US" dirty="0">
                           <a:solidFill>
@@ -19067,6 +19496,14 @@
                           </a:solidFill>
                         </a:rPr>
                       </a:br>
+                      <a:r>
+                        <a:rPr lang="en-US" dirty="0">
+                          <a:solidFill>
+                            <a:schemeClr val="tx1"/>
+                          </a:solidFill>
+                        </a:rPr>
+                        <a:t/>
+                      </a:r>
                       <a:br>
                         <a:rPr lang="en-US" dirty="0">
                           <a:solidFill>
@@ -19074,6 +19511,14 @@
                           </a:solidFill>
                         </a:rPr>
                       </a:br>
+                      <a:r>
+                        <a:rPr lang="en-US" dirty="0">
+                          <a:solidFill>
+                            <a:schemeClr val="tx1"/>
+                          </a:solidFill>
+                        </a:rPr>
+                        <a:t/>
+                      </a:r>
                       <a:br>
                         <a:rPr lang="en-US" dirty="0">
                           <a:solidFill>
@@ -19081,6 +19526,14 @@
                           </a:solidFill>
                         </a:rPr>
                       </a:br>
+                      <a:r>
+                        <a:rPr lang="en-US" dirty="0">
+                          <a:solidFill>
+                            <a:schemeClr val="tx1"/>
+                          </a:solidFill>
+                        </a:rPr>
+                        <a:t/>
+                      </a:r>
                       <a:br>
                         <a:rPr lang="en-US" dirty="0">
                           <a:solidFill>
@@ -19088,6 +19541,14 @@
                           </a:solidFill>
                         </a:rPr>
                       </a:br>
+                      <a:r>
+                        <a:rPr lang="en-US" dirty="0">
+                          <a:solidFill>
+                            <a:schemeClr val="tx1"/>
+                          </a:solidFill>
+                        </a:rPr>
+                        <a:t/>
+                      </a:r>
                       <a:br>
                         <a:rPr lang="en-US" dirty="0">
                           <a:solidFill>
@@ -19095,6 +19556,14 @@
                           </a:solidFill>
                         </a:rPr>
                       </a:br>
+                      <a:r>
+                        <a:rPr lang="en-US" dirty="0">
+                          <a:solidFill>
+                            <a:schemeClr val="tx1"/>
+                          </a:solidFill>
+                        </a:rPr>
+                        <a:t/>
+                      </a:r>
                       <a:br>
                         <a:rPr lang="en-US" dirty="0">
                           <a:solidFill>
@@ -19102,6 +19571,14 @@
                           </a:solidFill>
                         </a:rPr>
                       </a:br>
+                      <a:r>
+                        <a:rPr lang="en-US" dirty="0">
+                          <a:solidFill>
+                            <a:schemeClr val="tx1"/>
+                          </a:solidFill>
+                        </a:rPr>
+                        <a:t/>
+                      </a:r>
                       <a:br>
                         <a:rPr lang="en-US" dirty="0">
                           <a:solidFill>
@@ -19109,6 +19586,14 @@
                           </a:solidFill>
                         </a:rPr>
                       </a:br>
+                      <a:r>
+                        <a:rPr lang="en-US" dirty="0">
+                          <a:solidFill>
+                            <a:schemeClr val="tx1"/>
+                          </a:solidFill>
+                        </a:rPr>
+                        <a:t/>
+                      </a:r>
                       <a:br>
                         <a:rPr lang="en-US" dirty="0">
                           <a:solidFill>
@@ -19116,6 +19601,14 @@
                           </a:solidFill>
                         </a:rPr>
                       </a:br>
+                      <a:r>
+                        <a:rPr lang="en-US" dirty="0">
+                          <a:solidFill>
+                            <a:schemeClr val="tx1"/>
+                          </a:solidFill>
+                        </a:rPr>
+                        <a:t/>
+                      </a:r>
                       <a:br>
                         <a:rPr lang="en-US" dirty="0">
                           <a:solidFill>
@@ -19123,6 +19616,14 @@
                           </a:solidFill>
                         </a:rPr>
                       </a:br>
+                      <a:r>
+                        <a:rPr lang="en-US" dirty="0">
+                          <a:solidFill>
+                            <a:schemeClr val="tx1"/>
+                          </a:solidFill>
+                        </a:rPr>
+                        <a:t/>
+                      </a:r>
                       <a:br>
                         <a:rPr lang="en-US" dirty="0">
                           <a:solidFill>
@@ -19854,6 +20355,13 @@
   <p:clrMapOvr>
     <a:masterClrMapping/>
   </p:clrMapOvr>
+  <p:timing>
+    <p:tnLst>
+      <p:par>
+        <p:cTn id="1" dur="indefinite" restart="never" nodeType="tmRoot"/>
+      </p:par>
+    </p:tnLst>
+  </p:timing>
 </p:sld>
 </file>
 
@@ -20182,6 +20690,14 @@
                         </a:rPr>
                         <a:t>Как обрабатывать удаление файлов, которые короче одного сегмента журнала?</a:t>
                       </a:r>
+                      <a:r>
+                        <a:rPr lang="en-US" dirty="0">
+                          <a:solidFill>
+                            <a:schemeClr val="tx1"/>
+                          </a:solidFill>
+                        </a:rPr>
+                        <a:t/>
+                      </a:r>
                       <a:br>
                         <a:rPr lang="en-US" dirty="0">
                           <a:solidFill>
@@ -20189,6 +20705,14 @@
                           </a:solidFill>
                         </a:rPr>
                       </a:br>
+                      <a:r>
+                        <a:rPr lang="en-US" dirty="0">
+                          <a:solidFill>
+                            <a:schemeClr val="tx1"/>
+                          </a:solidFill>
+                        </a:rPr>
+                        <a:t/>
+                      </a:r>
                       <a:br>
                         <a:rPr lang="en-US" dirty="0">
                           <a:solidFill>
@@ -20204,6 +20728,14 @@
                         </a:rPr>
                         <a:t>Рассмотрим такой пример:</a:t>
                       </a:r>
+                      <a:r>
+                        <a:rPr lang="en-US" dirty="0">
+                          <a:solidFill>
+                            <a:schemeClr val="tx1"/>
+                          </a:solidFill>
+                        </a:rPr>
+                        <a:t/>
+                      </a:r>
                       <a:br>
                         <a:rPr lang="en-US" dirty="0">
                           <a:solidFill>
@@ -20211,6 +20743,14 @@
                           </a:solidFill>
                         </a:rPr>
                       </a:br>
+                      <a:r>
+                        <a:rPr lang="en-US" dirty="0">
+                          <a:solidFill>
+                            <a:schemeClr val="tx1"/>
+                          </a:solidFill>
+                        </a:rPr>
+                        <a:t/>
+                      </a:r>
                       <a:br>
                         <a:rPr lang="en-US" dirty="0">
                           <a:solidFill>
@@ -20218,6 +20758,14 @@
                           </a:solidFill>
                         </a:rPr>
                       </a:br>
+                      <a:r>
+                        <a:rPr lang="en-US" dirty="0">
+                          <a:solidFill>
+                            <a:schemeClr val="tx1"/>
+                          </a:solidFill>
+                        </a:rPr>
+                        <a:t/>
+                      </a:r>
                       <a:br>
                         <a:rPr lang="en-US" dirty="0">
                           <a:solidFill>
@@ -20225,6 +20773,14 @@
                           </a:solidFill>
                         </a:rPr>
                       </a:br>
+                      <a:r>
+                        <a:rPr lang="en-US" dirty="0">
+                          <a:solidFill>
+                            <a:schemeClr val="tx1"/>
+                          </a:solidFill>
+                        </a:rPr>
+                        <a:t/>
+                      </a:r>
                       <a:br>
                         <a:rPr lang="en-US" dirty="0">
                           <a:solidFill>
@@ -20232,6 +20788,14 @@
                           </a:solidFill>
                         </a:rPr>
                       </a:br>
+                      <a:r>
+                        <a:rPr lang="en-US" dirty="0">
+                          <a:solidFill>
+                            <a:schemeClr val="tx1"/>
+                          </a:solidFill>
+                        </a:rPr>
+                        <a:t/>
+                      </a:r>
                       <a:br>
                         <a:rPr lang="en-US" dirty="0">
                           <a:solidFill>
@@ -20239,6 +20803,14 @@
                           </a:solidFill>
                         </a:rPr>
                       </a:br>
+                      <a:r>
+                        <a:rPr lang="en-US" dirty="0">
+                          <a:solidFill>
+                            <a:schemeClr val="tx1"/>
+                          </a:solidFill>
+                        </a:rPr>
+                        <a:t/>
+                      </a:r>
                       <a:br>
                         <a:rPr lang="en-US" dirty="0">
                           <a:solidFill>
@@ -20246,6 +20818,14 @@
                           </a:solidFill>
                         </a:rPr>
                       </a:br>
+                      <a:r>
+                        <a:rPr lang="ru-RU" dirty="0">
+                          <a:solidFill>
+                            <a:schemeClr val="tx1"/>
+                          </a:solidFill>
+                        </a:rPr>
+                        <a:t/>
+                      </a:r>
                       <a:br>
                         <a:rPr lang="ru-RU" dirty="0">
                           <a:solidFill>
@@ -20381,6 +20961,14 @@
                         </a:rPr>
                         <a:t>других файлов.</a:t>
                       </a:r>
+                      <a:r>
+                        <a:rPr lang="en-US" dirty="0">
+                          <a:solidFill>
+                            <a:schemeClr val="tx1"/>
+                          </a:solidFill>
+                        </a:rPr>
+                        <a:t/>
+                      </a:r>
                       <a:br>
                         <a:rPr lang="en-US" dirty="0">
                           <a:solidFill>
@@ -20388,6 +20976,14 @@
                           </a:solidFill>
                         </a:rPr>
                       </a:br>
+                      <a:r>
+                        <a:rPr lang="en-US" dirty="0">
+                          <a:solidFill>
+                            <a:schemeClr val="tx1"/>
+                          </a:solidFill>
+                        </a:rPr>
+                        <a:t/>
+                      </a:r>
                       <a:br>
                         <a:rPr lang="en-US" dirty="0">
                           <a:solidFill>
@@ -21119,6 +21715,13 @@
   <p:clrMapOvr>
     <a:masterClrMapping/>
   </p:clrMapOvr>
+  <p:timing>
+    <p:tnLst>
+      <p:par>
+        <p:cTn id="1" dur="indefinite" restart="never" nodeType="tmRoot"/>
+      </p:par>
+    </p:tnLst>
+  </p:timing>
 </p:sld>
 </file>
 
@@ -21588,6 +22191,13 @@
   <p:clrMapOvr>
     <a:masterClrMapping/>
   </p:clrMapOvr>
+  <p:timing>
+    <p:tnLst>
+      <p:par>
+        <p:cTn id="1" dur="indefinite" restart="never" nodeType="tmRoot"/>
+      </p:par>
+    </p:tnLst>
+  </p:timing>
 </p:sld>
 </file>
 
@@ -22115,6 +22725,13 @@
   <p:clrMapOvr>
     <a:masterClrMapping/>
   </p:clrMapOvr>
+  <p:timing>
+    <p:tnLst>
+      <p:par>
+        <p:cTn id="1" dur="indefinite" restart="never" nodeType="tmRoot"/>
+      </p:par>
+    </p:tnLst>
+  </p:timing>
 </p:sld>
 </file>
 
@@ -22461,6 +23078,13 @@
   <p:clrMapOvr>
     <a:masterClrMapping/>
   </p:clrMapOvr>
+  <p:timing>
+    <p:tnLst>
+      <p:par>
+        <p:cTn id="1" dur="indefinite" restart="never" nodeType="tmRoot"/>
+      </p:par>
+    </p:tnLst>
+  </p:timing>
 </p:sld>
 </file>
 
@@ -22605,14 +23229,14 @@
           <p:nvPr>
             <p:extLst>
               <p:ext uri="{D42A27DB-BD31-4B8C-83A1-F6EECF244321}">
-                <p14:modId xmlns:p14="http://schemas.microsoft.com/office/powerpoint/2010/main" val="3418290888"/>
+                <p14:modId xmlns:p14="http://schemas.microsoft.com/office/powerpoint/2010/main" val="3459687760"/>
               </p:ext>
             </p:extLst>
           </p:nvPr>
         </p:nvGraphicFramePr>
         <p:xfrm>
           <a:off x="0" y="365760"/>
-          <a:ext cx="12192000" cy="6035040"/>
+          <a:ext cx="12192000" cy="3566160"/>
         </p:xfrm>
         <a:graphic>
           <a:graphicData uri="http://schemas.openxmlformats.org/drawingml/2006/table">
@@ -22919,227 +23543,21 @@
                             <a:schemeClr val="tx1"/>
                           </a:solidFill>
                         </a:rPr>
-                        <a:t>заголовок транзакции.</a:t>
+                        <a:t>заголовок транзакции</a:t>
+                      </a:r>
+                      <a:r>
+                        <a:rPr lang="ru-RU" dirty="0" smtClean="0">
+                          <a:solidFill>
+                            <a:schemeClr val="tx1"/>
+                          </a:solidFill>
+                        </a:rPr>
+                        <a:t>.</a:t>
                       </a:r>
                       <a:endParaRPr lang="en-US" dirty="0">
                         <a:solidFill>
                           <a:schemeClr val="tx1"/>
                         </a:solidFill>
                       </a:endParaRPr>
-                    </a:p>
-                    <a:p>
-                      <a:pPr marL="285750" indent="-285750">
-                        <a:buFont typeface="Arial" panose="020B0604020202020204" pitchFamily="34" charset="0"/>
-                        <a:buChar char="•"/>
-                      </a:pPr>
-                      <a:endParaRPr lang="en-US" dirty="0">
-                        <a:solidFill>
-                          <a:schemeClr val="tx1"/>
-                        </a:solidFill>
-                      </a:endParaRPr>
-                    </a:p>
-                    <a:p>
-                      <a:pPr marL="0" indent="0">
-                        <a:buFont typeface="Arial" panose="020B0604020202020204" pitchFamily="34" charset="0"/>
-                        <a:buNone/>
-                      </a:pPr>
-                      <a:r>
-                        <a:rPr lang="ru-RU" dirty="0">
-                          <a:solidFill>
-                            <a:schemeClr val="tx1"/>
-                          </a:solidFill>
-                        </a:rPr>
-                        <a:t>В </a:t>
-                      </a:r>
-                      <a:r>
-                        <a:rPr lang="en-US" dirty="0">
-                          <a:solidFill>
-                            <a:schemeClr val="tx1"/>
-                          </a:solidFill>
-                        </a:rPr>
-                        <a:t>F2FS</a:t>
-                      </a:r>
-                      <a:r>
-                        <a:rPr lang="ru-RU" dirty="0">
-                          <a:solidFill>
-                            <a:schemeClr val="tx1"/>
-                          </a:solidFill>
-                        </a:rPr>
-                        <a:t> при </a:t>
-                      </a:r>
-                      <a:r>
-                        <a:rPr lang="en-US" dirty="0" err="1">
-                          <a:solidFill>
-                            <a:schemeClr val="tx1"/>
-                          </a:solidFill>
-                        </a:rPr>
-                        <a:t>fsync</a:t>
-                      </a:r>
-                      <a:r>
-                        <a:rPr lang="en-US" dirty="0">
-                          <a:solidFill>
-                            <a:schemeClr val="tx1"/>
-                          </a:solidFill>
-                        </a:rPr>
-                        <a:t>() </a:t>
-                      </a:r>
-                      <a:r>
-                        <a:rPr lang="ru-RU" dirty="0">
-                          <a:solidFill>
-                            <a:schemeClr val="tx1"/>
-                          </a:solidFill>
-                        </a:rPr>
-                        <a:t>на отдельный файл в журнал выписываются только блоки данных файла и его </a:t>
-                      </a:r>
-                      <a:r>
-                        <a:rPr lang="ru-RU" dirty="0" err="1">
-                          <a:solidFill>
-                            <a:schemeClr val="tx1"/>
-                          </a:solidFill>
-                        </a:rPr>
-                        <a:t>инода</a:t>
-                      </a:r>
-                      <a:r>
-                        <a:rPr lang="ru-RU" dirty="0">
-                          <a:solidFill>
-                            <a:schemeClr val="tx1"/>
-                          </a:solidFill>
-                        </a:rPr>
-                        <a:t>, а длина этой записи сохраняется в </a:t>
-                      </a:r>
-                      <a:r>
-                        <a:rPr lang="en-US" dirty="0">
-                          <a:solidFill>
-                            <a:schemeClr val="tx1"/>
-                          </a:solidFill>
-                        </a:rPr>
-                        <a:t>checkpoint region (</a:t>
-                      </a:r>
-                      <a:r>
-                        <a:rPr lang="ru-RU" dirty="0">
-                          <a:solidFill>
-                            <a:schemeClr val="tx1"/>
-                          </a:solidFill>
-                        </a:rPr>
-                        <a:t>не путать с указателем на голову транзакции!). Позже, при записи транзакции она форматируется так, чтобы выписанные при </a:t>
-                      </a:r>
-                      <a:r>
-                        <a:rPr lang="en-US" dirty="0" err="1">
-                          <a:solidFill>
-                            <a:schemeClr val="tx1"/>
-                          </a:solidFill>
-                        </a:rPr>
-                        <a:t>fsync</a:t>
-                      </a:r>
-                      <a:r>
-                        <a:rPr lang="en-US" dirty="0">
-                          <a:solidFill>
-                            <a:schemeClr val="tx1"/>
-                          </a:solidFill>
-                        </a:rPr>
-                        <a:t>() </a:t>
-                      </a:r>
-                      <a:r>
-                        <a:rPr lang="ru-RU" dirty="0">
-                          <a:solidFill>
-                            <a:schemeClr val="tx1"/>
-                          </a:solidFill>
-                        </a:rPr>
-                        <a:t>блоки данных составляли часть транзакции.</a:t>
-                      </a:r>
-                    </a:p>
-                    <a:p>
-                      <a:pPr marL="0" indent="0">
-                        <a:buFont typeface="Arial" panose="020B0604020202020204" pitchFamily="34" charset="0"/>
-                        <a:buNone/>
-                      </a:pPr>
-                      <a:endParaRPr lang="ru-RU" dirty="0">
-                        <a:solidFill>
-                          <a:schemeClr val="tx1"/>
-                        </a:solidFill>
-                      </a:endParaRPr>
-                    </a:p>
-                    <a:p>
-                      <a:pPr marL="0" indent="0">
-                        <a:buFont typeface="Arial" panose="020B0604020202020204" pitchFamily="34" charset="0"/>
-                        <a:buNone/>
-                      </a:pPr>
-                      <a:r>
-                        <a:rPr lang="ru-RU" dirty="0">
-                          <a:solidFill>
-                            <a:schemeClr val="tx1"/>
-                          </a:solidFill>
-                        </a:rPr>
-                        <a:t>Такое решение требует </a:t>
-                      </a:r>
-                      <a:r>
-                        <a:rPr lang="en-US" b="1" dirty="0">
-                          <a:solidFill>
-                            <a:schemeClr val="tx1"/>
-                          </a:solidFill>
-                        </a:rPr>
-                        <a:t>roll forward</a:t>
-                      </a:r>
-                      <a:r>
-                        <a:rPr lang="en-US" dirty="0">
-                          <a:solidFill>
-                            <a:schemeClr val="tx1"/>
-                          </a:solidFill>
-                        </a:rPr>
-                        <a:t> </a:t>
-                      </a:r>
-                      <a:r>
-                        <a:rPr lang="ru-RU" dirty="0">
-                          <a:solidFill>
-                            <a:schemeClr val="tx1"/>
-                          </a:solidFill>
-                        </a:rPr>
-                        <a:t>при монтировании файловой системы: после нахождения последней успешно применённой транзакции</a:t>
-                      </a:r>
-                      <a:r>
-                        <a:rPr lang="en-US" dirty="0">
-                          <a:solidFill>
-                            <a:schemeClr val="tx1"/>
-                          </a:solidFill>
-                        </a:rPr>
-                        <a:t> </a:t>
-                      </a:r>
-                      <a:r>
-                        <a:rPr lang="ru-RU" dirty="0">
-                          <a:solidFill>
-                            <a:schemeClr val="tx1"/>
-                          </a:solidFill>
-                        </a:rPr>
-                        <a:t>ФС должна</a:t>
-                      </a:r>
-                    </a:p>
-                    <a:p>
-                      <a:pPr marL="342900" indent="-342900">
-                        <a:buFont typeface="Arial" panose="020B0604020202020204" pitchFamily="34" charset="0"/>
-                        <a:buChar char="•"/>
-                      </a:pPr>
-                      <a:r>
-                        <a:rPr lang="ru-RU" dirty="0">
-                          <a:solidFill>
-                            <a:schemeClr val="tx1"/>
-                          </a:solidFill>
-                        </a:rPr>
-                        <a:t>применить изменения в страницах данных из неполной транзакции,</a:t>
-                      </a:r>
-                    </a:p>
-                    <a:p>
-                      <a:pPr marL="342900" indent="-342900">
-                        <a:buFont typeface="Arial" panose="020B0604020202020204" pitchFamily="34" charset="0"/>
-                        <a:buChar char="•"/>
-                      </a:pPr>
-                      <a:r>
-                        <a:rPr lang="ru-RU" dirty="0">
-                          <a:solidFill>
-                            <a:schemeClr val="tx1"/>
-                          </a:solidFill>
-                        </a:rPr>
-                        <a:t>дописать транзакцию до полной.</a:t>
-                      </a:r>
                     </a:p>
                   </a:txBody>
                   <a:tcPr/>
@@ -23154,6 +23572,930 @@
           </a:graphicData>
         </a:graphic>
       </p:graphicFrame>
+      <p:sp>
+        <p:nvSpPr>
+          <p:cNvPr id="3" name="Rectangle 2"/>
+          <p:cNvSpPr/>
+          <p:nvPr/>
+        </p:nvSpPr>
+        <p:spPr>
+          <a:xfrm>
+            <a:off x="1903615" y="4039986"/>
+            <a:ext cx="1155469" cy="266007"/>
+          </a:xfrm>
+          <a:prstGeom prst="rect">
+            <a:avLst/>
+          </a:prstGeom>
+        </p:spPr>
+        <p:style>
+          <a:lnRef idx="2">
+            <a:schemeClr val="accent1">
+              <a:shade val="50000"/>
+            </a:schemeClr>
+          </a:lnRef>
+          <a:fillRef idx="1">
+            <a:schemeClr val="accent1"/>
+          </a:fillRef>
+          <a:effectRef idx="0">
+            <a:schemeClr val="accent1"/>
+          </a:effectRef>
+          <a:fontRef idx="minor">
+            <a:schemeClr val="lt1"/>
+          </a:fontRef>
+        </p:style>
+        <p:txBody>
+          <a:bodyPr rtlCol="0" anchor="ctr"/>
+          <a:lstStyle/>
+          <a:p>
+            <a:pPr algn="ctr"/>
+            <a:r>
+              <a:rPr lang="en-US" dirty="0" smtClean="0"/>
+              <a:t>Directory</a:t>
+            </a:r>
+            <a:endParaRPr lang="ru-RU" dirty="0"/>
+          </a:p>
+        </p:txBody>
+      </p:sp>
+      <p:sp>
+        <p:nvSpPr>
+          <p:cNvPr id="8" name="Rectangle 7"/>
+          <p:cNvSpPr/>
+          <p:nvPr/>
+        </p:nvSpPr>
+        <p:spPr>
+          <a:xfrm>
+            <a:off x="748146" y="4486103"/>
+            <a:ext cx="1155469" cy="266007"/>
+          </a:xfrm>
+          <a:prstGeom prst="rect">
+            <a:avLst/>
+          </a:prstGeom>
+        </p:spPr>
+        <p:style>
+          <a:lnRef idx="2">
+            <a:schemeClr val="accent1">
+              <a:shade val="50000"/>
+            </a:schemeClr>
+          </a:lnRef>
+          <a:fillRef idx="1">
+            <a:schemeClr val="accent1"/>
+          </a:fillRef>
+          <a:effectRef idx="0">
+            <a:schemeClr val="accent1"/>
+          </a:effectRef>
+          <a:fontRef idx="minor">
+            <a:schemeClr val="lt1"/>
+          </a:fontRef>
+        </p:style>
+        <p:txBody>
+          <a:bodyPr rtlCol="0" anchor="ctr"/>
+          <a:lstStyle/>
+          <a:p>
+            <a:pPr algn="ctr"/>
+            <a:r>
+              <a:rPr lang="en-US" dirty="0" smtClean="0"/>
+              <a:t>File</a:t>
+            </a:r>
+            <a:endParaRPr lang="ru-RU" dirty="0"/>
+          </a:p>
+        </p:txBody>
+      </p:sp>
+      <p:sp>
+        <p:nvSpPr>
+          <p:cNvPr id="9" name="Rectangle 8"/>
+          <p:cNvSpPr/>
+          <p:nvPr/>
+        </p:nvSpPr>
+        <p:spPr>
+          <a:xfrm>
+            <a:off x="3059084" y="4486102"/>
+            <a:ext cx="1155469" cy="266007"/>
+          </a:xfrm>
+          <a:prstGeom prst="rect">
+            <a:avLst/>
+          </a:prstGeom>
+        </p:spPr>
+        <p:style>
+          <a:lnRef idx="2">
+            <a:schemeClr val="accent1">
+              <a:shade val="50000"/>
+            </a:schemeClr>
+          </a:lnRef>
+          <a:fillRef idx="1">
+            <a:schemeClr val="accent1"/>
+          </a:fillRef>
+          <a:effectRef idx="0">
+            <a:schemeClr val="accent1"/>
+          </a:effectRef>
+          <a:fontRef idx="minor">
+            <a:schemeClr val="lt1"/>
+          </a:fontRef>
+        </p:style>
+        <p:txBody>
+          <a:bodyPr rtlCol="0" anchor="ctr"/>
+          <a:lstStyle/>
+          <a:p>
+            <a:pPr algn="ctr"/>
+            <a:r>
+              <a:rPr lang="en-US" dirty="0" smtClean="0"/>
+              <a:t>Directory</a:t>
+            </a:r>
+            <a:endParaRPr lang="ru-RU" dirty="0"/>
+          </a:p>
+        </p:txBody>
+      </p:sp>
+      <p:sp>
+        <p:nvSpPr>
+          <p:cNvPr id="10" name="Rectangle 9"/>
+          <p:cNvSpPr/>
+          <p:nvPr/>
+        </p:nvSpPr>
+        <p:spPr>
+          <a:xfrm>
+            <a:off x="1903615" y="4966254"/>
+            <a:ext cx="1155469" cy="266007"/>
+          </a:xfrm>
+          <a:prstGeom prst="rect">
+            <a:avLst/>
+          </a:prstGeom>
+        </p:spPr>
+        <p:style>
+          <a:lnRef idx="2">
+            <a:schemeClr val="accent1">
+              <a:shade val="50000"/>
+            </a:schemeClr>
+          </a:lnRef>
+          <a:fillRef idx="1">
+            <a:schemeClr val="accent1"/>
+          </a:fillRef>
+          <a:effectRef idx="0">
+            <a:schemeClr val="accent1"/>
+          </a:effectRef>
+          <a:fontRef idx="minor">
+            <a:schemeClr val="lt1"/>
+          </a:fontRef>
+        </p:style>
+        <p:txBody>
+          <a:bodyPr rtlCol="0" anchor="ctr"/>
+          <a:lstStyle/>
+          <a:p>
+            <a:pPr algn="ctr"/>
+            <a:r>
+              <a:rPr lang="en-US" dirty="0" smtClean="0"/>
+              <a:t>Directory</a:t>
+            </a:r>
+            <a:endParaRPr lang="ru-RU" dirty="0"/>
+          </a:p>
+        </p:txBody>
+      </p:sp>
+      <p:sp>
+        <p:nvSpPr>
+          <p:cNvPr id="11" name="Rectangle 10"/>
+          <p:cNvSpPr/>
+          <p:nvPr/>
+        </p:nvSpPr>
+        <p:spPr>
+          <a:xfrm>
+            <a:off x="4214553" y="4966253"/>
+            <a:ext cx="1155469" cy="266007"/>
+          </a:xfrm>
+          <a:prstGeom prst="rect">
+            <a:avLst/>
+          </a:prstGeom>
+        </p:spPr>
+        <p:style>
+          <a:lnRef idx="2">
+            <a:schemeClr val="accent1">
+              <a:shade val="50000"/>
+            </a:schemeClr>
+          </a:lnRef>
+          <a:fillRef idx="1">
+            <a:schemeClr val="accent1"/>
+          </a:fillRef>
+          <a:effectRef idx="0">
+            <a:schemeClr val="accent1"/>
+          </a:effectRef>
+          <a:fontRef idx="minor">
+            <a:schemeClr val="lt1"/>
+          </a:fontRef>
+        </p:style>
+        <p:txBody>
+          <a:bodyPr rtlCol="0" anchor="ctr"/>
+          <a:lstStyle/>
+          <a:p>
+            <a:pPr algn="ctr"/>
+            <a:r>
+              <a:rPr lang="en-US" dirty="0" smtClean="0"/>
+              <a:t>Directory</a:t>
+            </a:r>
+            <a:endParaRPr lang="ru-RU" dirty="0"/>
+          </a:p>
+        </p:txBody>
+      </p:sp>
+      <p:sp>
+        <p:nvSpPr>
+          <p:cNvPr id="12" name="Rectangle 11"/>
+          <p:cNvSpPr/>
+          <p:nvPr/>
+        </p:nvSpPr>
+        <p:spPr>
+          <a:xfrm>
+            <a:off x="3059083" y="5446404"/>
+            <a:ext cx="1155469" cy="266007"/>
+          </a:xfrm>
+          <a:prstGeom prst="rect">
+            <a:avLst/>
+          </a:prstGeom>
+        </p:spPr>
+        <p:style>
+          <a:lnRef idx="2">
+            <a:schemeClr val="accent1">
+              <a:shade val="50000"/>
+            </a:schemeClr>
+          </a:lnRef>
+          <a:fillRef idx="1">
+            <a:schemeClr val="accent1"/>
+          </a:fillRef>
+          <a:effectRef idx="0">
+            <a:schemeClr val="accent1"/>
+          </a:effectRef>
+          <a:fontRef idx="minor">
+            <a:schemeClr val="lt1"/>
+          </a:fontRef>
+        </p:style>
+        <p:txBody>
+          <a:bodyPr rtlCol="0" anchor="ctr"/>
+          <a:lstStyle/>
+          <a:p>
+            <a:pPr algn="ctr"/>
+            <a:r>
+              <a:rPr lang="en-US" dirty="0" smtClean="0"/>
+              <a:t>Directory</a:t>
+            </a:r>
+            <a:endParaRPr lang="ru-RU" dirty="0"/>
+          </a:p>
+        </p:txBody>
+      </p:sp>
+      <p:sp>
+        <p:nvSpPr>
+          <p:cNvPr id="13" name="Rectangle 12"/>
+          <p:cNvSpPr/>
+          <p:nvPr/>
+        </p:nvSpPr>
+        <p:spPr>
+          <a:xfrm>
+            <a:off x="5370022" y="5446404"/>
+            <a:ext cx="1155469" cy="266007"/>
+          </a:xfrm>
+          <a:prstGeom prst="rect">
+            <a:avLst/>
+          </a:prstGeom>
+        </p:spPr>
+        <p:style>
+          <a:lnRef idx="2">
+            <a:schemeClr val="accent1">
+              <a:shade val="50000"/>
+            </a:schemeClr>
+          </a:lnRef>
+          <a:fillRef idx="1">
+            <a:schemeClr val="accent1"/>
+          </a:fillRef>
+          <a:effectRef idx="0">
+            <a:schemeClr val="accent1"/>
+          </a:effectRef>
+          <a:fontRef idx="minor">
+            <a:schemeClr val="lt1"/>
+          </a:fontRef>
+        </p:style>
+        <p:txBody>
+          <a:bodyPr rtlCol="0" anchor="ctr"/>
+          <a:lstStyle/>
+          <a:p>
+            <a:pPr algn="ctr"/>
+            <a:r>
+              <a:rPr lang="en-US" dirty="0" smtClean="0"/>
+              <a:t>File</a:t>
+            </a:r>
+            <a:endParaRPr lang="ru-RU" dirty="0"/>
+          </a:p>
+        </p:txBody>
+      </p:sp>
+      <p:cxnSp>
+        <p:nvCxnSpPr>
+          <p:cNvPr id="14" name="Straight Arrow Connector 13"/>
+          <p:cNvCxnSpPr>
+            <a:stCxn id="3" idx="2"/>
+            <a:endCxn id="8" idx="0"/>
+          </p:cNvCxnSpPr>
+          <p:nvPr/>
+        </p:nvCxnSpPr>
+        <p:spPr>
+          <a:xfrm flipH="1">
+            <a:off x="1325881" y="4305993"/>
+            <a:ext cx="1155469" cy="180110"/>
+          </a:xfrm>
+          <a:prstGeom prst="straightConnector1">
+            <a:avLst/>
+          </a:prstGeom>
+          <a:ln w="12700">
+            <a:tailEnd type="triangle"/>
+          </a:ln>
+        </p:spPr>
+        <p:style>
+          <a:lnRef idx="1">
+            <a:schemeClr val="accent1"/>
+          </a:lnRef>
+          <a:fillRef idx="0">
+            <a:schemeClr val="accent1"/>
+          </a:fillRef>
+          <a:effectRef idx="0">
+            <a:schemeClr val="accent1"/>
+          </a:effectRef>
+          <a:fontRef idx="minor">
+            <a:schemeClr val="tx1"/>
+          </a:fontRef>
+        </p:style>
+      </p:cxnSp>
+      <p:cxnSp>
+        <p:nvCxnSpPr>
+          <p:cNvPr id="15" name="Straight Arrow Connector 14"/>
+          <p:cNvCxnSpPr>
+            <a:stCxn id="3" idx="2"/>
+            <a:endCxn id="9" idx="0"/>
+          </p:cNvCxnSpPr>
+          <p:nvPr/>
+        </p:nvCxnSpPr>
+        <p:spPr>
+          <a:xfrm>
+            <a:off x="2481350" y="4305993"/>
+            <a:ext cx="1155469" cy="180109"/>
+          </a:xfrm>
+          <a:prstGeom prst="straightConnector1">
+            <a:avLst/>
+          </a:prstGeom>
+          <a:ln w="12700">
+            <a:tailEnd type="triangle"/>
+          </a:ln>
+        </p:spPr>
+        <p:style>
+          <a:lnRef idx="1">
+            <a:schemeClr val="accent1"/>
+          </a:lnRef>
+          <a:fillRef idx="0">
+            <a:schemeClr val="accent1"/>
+          </a:fillRef>
+          <a:effectRef idx="0">
+            <a:schemeClr val="accent1"/>
+          </a:effectRef>
+          <a:fontRef idx="minor">
+            <a:schemeClr val="tx1"/>
+          </a:fontRef>
+        </p:style>
+      </p:cxnSp>
+      <p:cxnSp>
+        <p:nvCxnSpPr>
+          <p:cNvPr id="18" name="Straight Arrow Connector 17"/>
+          <p:cNvCxnSpPr>
+            <a:stCxn id="9" idx="2"/>
+            <a:endCxn id="10" idx="0"/>
+          </p:cNvCxnSpPr>
+          <p:nvPr/>
+        </p:nvCxnSpPr>
+        <p:spPr>
+          <a:xfrm flipH="1">
+            <a:off x="2481350" y="4752109"/>
+            <a:ext cx="1155469" cy="214145"/>
+          </a:xfrm>
+          <a:prstGeom prst="straightConnector1">
+            <a:avLst/>
+          </a:prstGeom>
+          <a:ln w="12700">
+            <a:tailEnd type="triangle"/>
+          </a:ln>
+        </p:spPr>
+        <p:style>
+          <a:lnRef idx="1">
+            <a:schemeClr val="accent1"/>
+          </a:lnRef>
+          <a:fillRef idx="0">
+            <a:schemeClr val="accent1"/>
+          </a:fillRef>
+          <a:effectRef idx="0">
+            <a:schemeClr val="accent1"/>
+          </a:effectRef>
+          <a:fontRef idx="minor">
+            <a:schemeClr val="tx1"/>
+          </a:fontRef>
+        </p:style>
+      </p:cxnSp>
+      <p:cxnSp>
+        <p:nvCxnSpPr>
+          <p:cNvPr id="21" name="Straight Arrow Connector 20"/>
+          <p:cNvCxnSpPr>
+            <a:stCxn id="9" idx="2"/>
+            <a:endCxn id="11" idx="0"/>
+          </p:cNvCxnSpPr>
+          <p:nvPr/>
+        </p:nvCxnSpPr>
+        <p:spPr>
+          <a:xfrm>
+            <a:off x="3636819" y="4752109"/>
+            <a:ext cx="1155469" cy="214144"/>
+          </a:xfrm>
+          <a:prstGeom prst="straightConnector1">
+            <a:avLst/>
+          </a:prstGeom>
+          <a:ln w="12700">
+            <a:tailEnd type="triangle"/>
+          </a:ln>
+        </p:spPr>
+        <p:style>
+          <a:lnRef idx="1">
+            <a:schemeClr val="accent1"/>
+          </a:lnRef>
+          <a:fillRef idx="0">
+            <a:schemeClr val="accent1"/>
+          </a:fillRef>
+          <a:effectRef idx="0">
+            <a:schemeClr val="accent1"/>
+          </a:effectRef>
+          <a:fontRef idx="minor">
+            <a:schemeClr val="tx1"/>
+          </a:fontRef>
+        </p:style>
+      </p:cxnSp>
+      <p:cxnSp>
+        <p:nvCxnSpPr>
+          <p:cNvPr id="24" name="Straight Arrow Connector 23"/>
+          <p:cNvCxnSpPr>
+            <a:stCxn id="11" idx="2"/>
+            <a:endCxn id="12" idx="0"/>
+          </p:cNvCxnSpPr>
+          <p:nvPr/>
+        </p:nvCxnSpPr>
+        <p:spPr>
+          <a:xfrm flipH="1">
+            <a:off x="3636818" y="5232260"/>
+            <a:ext cx="1155470" cy="214144"/>
+          </a:xfrm>
+          <a:prstGeom prst="straightConnector1">
+            <a:avLst/>
+          </a:prstGeom>
+          <a:ln w="12700">
+            <a:tailEnd type="triangle"/>
+          </a:ln>
+        </p:spPr>
+        <p:style>
+          <a:lnRef idx="1">
+            <a:schemeClr val="accent1"/>
+          </a:lnRef>
+          <a:fillRef idx="0">
+            <a:schemeClr val="accent1"/>
+          </a:fillRef>
+          <a:effectRef idx="0">
+            <a:schemeClr val="accent1"/>
+          </a:effectRef>
+          <a:fontRef idx="minor">
+            <a:schemeClr val="tx1"/>
+          </a:fontRef>
+        </p:style>
+      </p:cxnSp>
+      <p:cxnSp>
+        <p:nvCxnSpPr>
+          <p:cNvPr id="27" name="Straight Arrow Connector 26"/>
+          <p:cNvCxnSpPr>
+            <a:stCxn id="11" idx="2"/>
+            <a:endCxn id="13" idx="0"/>
+          </p:cNvCxnSpPr>
+          <p:nvPr/>
+        </p:nvCxnSpPr>
+        <p:spPr>
+          <a:xfrm>
+            <a:off x="4792288" y="5232260"/>
+            <a:ext cx="1155469" cy="214144"/>
+          </a:xfrm>
+          <a:prstGeom prst="straightConnector1">
+            <a:avLst/>
+          </a:prstGeom>
+          <a:ln w="12700">
+            <a:tailEnd type="triangle"/>
+          </a:ln>
+        </p:spPr>
+        <p:style>
+          <a:lnRef idx="1">
+            <a:schemeClr val="accent1"/>
+          </a:lnRef>
+          <a:fillRef idx="0">
+            <a:schemeClr val="accent1"/>
+          </a:fillRef>
+          <a:effectRef idx="0">
+            <a:schemeClr val="accent1"/>
+          </a:effectRef>
+          <a:fontRef idx="minor">
+            <a:schemeClr val="tx1"/>
+          </a:fontRef>
+        </p:style>
+      </p:cxnSp>
+      <p:sp>
+        <p:nvSpPr>
+          <p:cNvPr id="30" name="Rectangle 29"/>
+          <p:cNvSpPr/>
+          <p:nvPr/>
+        </p:nvSpPr>
+        <p:spPr>
+          <a:xfrm>
+            <a:off x="8531629" y="5446404"/>
+            <a:ext cx="1155469" cy="266007"/>
+          </a:xfrm>
+          <a:prstGeom prst="rect">
+            <a:avLst/>
+          </a:prstGeom>
+        </p:spPr>
+        <p:style>
+          <a:lnRef idx="2">
+            <a:schemeClr val="accent3">
+              <a:shade val="50000"/>
+            </a:schemeClr>
+          </a:lnRef>
+          <a:fillRef idx="1">
+            <a:schemeClr val="accent3"/>
+          </a:fillRef>
+          <a:effectRef idx="0">
+            <a:schemeClr val="accent3"/>
+          </a:effectRef>
+          <a:fontRef idx="minor">
+            <a:schemeClr val="lt1"/>
+          </a:fontRef>
+        </p:style>
+        <p:txBody>
+          <a:bodyPr rtlCol="0" anchor="ctr"/>
+          <a:lstStyle/>
+          <a:p>
+            <a:pPr algn="ctr"/>
+            <a:r>
+              <a:rPr lang="en-US" dirty="0" smtClean="0"/>
+              <a:t>File</a:t>
+            </a:r>
+            <a:endParaRPr lang="ru-RU" dirty="0"/>
+          </a:p>
+        </p:txBody>
+      </p:sp>
+      <p:sp>
+        <p:nvSpPr>
+          <p:cNvPr id="31" name="Rectangle 30"/>
+          <p:cNvSpPr/>
+          <p:nvPr/>
+        </p:nvSpPr>
+        <p:spPr>
+          <a:xfrm>
+            <a:off x="8531629" y="4966252"/>
+            <a:ext cx="1155469" cy="266007"/>
+          </a:xfrm>
+          <a:prstGeom prst="rect">
+            <a:avLst/>
+          </a:prstGeom>
+        </p:spPr>
+        <p:style>
+          <a:lnRef idx="2">
+            <a:schemeClr val="accent3">
+              <a:shade val="50000"/>
+            </a:schemeClr>
+          </a:lnRef>
+          <a:fillRef idx="1">
+            <a:schemeClr val="accent3"/>
+          </a:fillRef>
+          <a:effectRef idx="0">
+            <a:schemeClr val="accent3"/>
+          </a:effectRef>
+          <a:fontRef idx="minor">
+            <a:schemeClr val="lt1"/>
+          </a:fontRef>
+        </p:style>
+        <p:txBody>
+          <a:bodyPr rtlCol="0" anchor="ctr"/>
+          <a:lstStyle/>
+          <a:p>
+            <a:pPr algn="ctr"/>
+            <a:r>
+              <a:rPr lang="en-US" dirty="0" smtClean="0"/>
+              <a:t>Directory</a:t>
+            </a:r>
+            <a:endParaRPr lang="ru-RU" dirty="0"/>
+          </a:p>
+        </p:txBody>
+      </p:sp>
+      <p:sp>
+        <p:nvSpPr>
+          <p:cNvPr id="33" name="Rectangle 32"/>
+          <p:cNvSpPr/>
+          <p:nvPr/>
+        </p:nvSpPr>
+        <p:spPr>
+          <a:xfrm>
+            <a:off x="8531629" y="4486100"/>
+            <a:ext cx="1155469" cy="266007"/>
+          </a:xfrm>
+          <a:prstGeom prst="rect">
+            <a:avLst/>
+          </a:prstGeom>
+        </p:spPr>
+        <p:style>
+          <a:lnRef idx="2">
+            <a:schemeClr val="accent3">
+              <a:shade val="50000"/>
+            </a:schemeClr>
+          </a:lnRef>
+          <a:fillRef idx="1">
+            <a:schemeClr val="accent3"/>
+          </a:fillRef>
+          <a:effectRef idx="0">
+            <a:schemeClr val="accent3"/>
+          </a:effectRef>
+          <a:fontRef idx="minor">
+            <a:schemeClr val="lt1"/>
+          </a:fontRef>
+        </p:style>
+        <p:txBody>
+          <a:bodyPr rtlCol="0" anchor="ctr"/>
+          <a:lstStyle/>
+          <a:p>
+            <a:pPr algn="ctr"/>
+            <a:r>
+              <a:rPr lang="en-US" dirty="0" smtClean="0"/>
+              <a:t>Directory</a:t>
+            </a:r>
+            <a:endParaRPr lang="ru-RU" dirty="0"/>
+          </a:p>
+        </p:txBody>
+      </p:sp>
+      <p:sp>
+        <p:nvSpPr>
+          <p:cNvPr id="34" name="Rectangle 33"/>
+          <p:cNvSpPr/>
+          <p:nvPr/>
+        </p:nvSpPr>
+        <p:spPr>
+          <a:xfrm>
+            <a:off x="8531629" y="4039985"/>
+            <a:ext cx="1155469" cy="266007"/>
+          </a:xfrm>
+          <a:prstGeom prst="rect">
+            <a:avLst/>
+          </a:prstGeom>
+        </p:spPr>
+        <p:style>
+          <a:lnRef idx="2">
+            <a:schemeClr val="accent3">
+              <a:shade val="50000"/>
+            </a:schemeClr>
+          </a:lnRef>
+          <a:fillRef idx="1">
+            <a:schemeClr val="accent3"/>
+          </a:fillRef>
+          <a:effectRef idx="0">
+            <a:schemeClr val="accent3"/>
+          </a:effectRef>
+          <a:fontRef idx="minor">
+            <a:schemeClr val="lt1"/>
+          </a:fontRef>
+        </p:style>
+        <p:txBody>
+          <a:bodyPr rtlCol="0" anchor="ctr"/>
+          <a:lstStyle/>
+          <a:p>
+            <a:pPr algn="ctr"/>
+            <a:r>
+              <a:rPr lang="en-US" dirty="0" smtClean="0"/>
+              <a:t>Directory</a:t>
+            </a:r>
+            <a:endParaRPr lang="ru-RU" dirty="0"/>
+          </a:p>
+        </p:txBody>
+      </p:sp>
+      <p:cxnSp>
+        <p:nvCxnSpPr>
+          <p:cNvPr id="36" name="Straight Arrow Connector 35"/>
+          <p:cNvCxnSpPr>
+            <a:stCxn id="34" idx="1"/>
+            <a:endCxn id="3" idx="3"/>
+          </p:cNvCxnSpPr>
+          <p:nvPr/>
+        </p:nvCxnSpPr>
+        <p:spPr>
+          <a:xfrm flipH="1">
+            <a:off x="3059084" y="4172989"/>
+            <a:ext cx="5472545" cy="1"/>
+          </a:xfrm>
+          <a:prstGeom prst="straightConnector1">
+            <a:avLst/>
+          </a:prstGeom>
+          <a:ln w="12700">
+            <a:tailEnd type="triangle"/>
+          </a:ln>
+        </p:spPr>
+        <p:style>
+          <a:lnRef idx="1">
+            <a:schemeClr val="dk1"/>
+          </a:lnRef>
+          <a:fillRef idx="0">
+            <a:schemeClr val="dk1"/>
+          </a:fillRef>
+          <a:effectRef idx="0">
+            <a:schemeClr val="dk1"/>
+          </a:effectRef>
+          <a:fontRef idx="minor">
+            <a:schemeClr val="tx1"/>
+          </a:fontRef>
+        </p:style>
+      </p:cxnSp>
+      <p:cxnSp>
+        <p:nvCxnSpPr>
+          <p:cNvPr id="37" name="Straight Arrow Connector 36"/>
+          <p:cNvCxnSpPr>
+            <a:stCxn id="33" idx="1"/>
+            <a:endCxn id="9" idx="3"/>
+          </p:cNvCxnSpPr>
+          <p:nvPr/>
+        </p:nvCxnSpPr>
+        <p:spPr>
+          <a:xfrm flipH="1">
+            <a:off x="4214553" y="4619104"/>
+            <a:ext cx="4317076" cy="2"/>
+          </a:xfrm>
+          <a:prstGeom prst="straightConnector1">
+            <a:avLst/>
+          </a:prstGeom>
+          <a:ln w="12700">
+            <a:tailEnd type="triangle"/>
+          </a:ln>
+        </p:spPr>
+        <p:style>
+          <a:lnRef idx="1">
+            <a:schemeClr val="dk1"/>
+          </a:lnRef>
+          <a:fillRef idx="0">
+            <a:schemeClr val="dk1"/>
+          </a:fillRef>
+          <a:effectRef idx="0">
+            <a:schemeClr val="dk1"/>
+          </a:effectRef>
+          <a:fontRef idx="minor">
+            <a:schemeClr val="tx1"/>
+          </a:fontRef>
+        </p:style>
+      </p:cxnSp>
+      <p:cxnSp>
+        <p:nvCxnSpPr>
+          <p:cNvPr id="40" name="Straight Arrow Connector 39"/>
+          <p:cNvCxnSpPr>
+            <a:stCxn id="31" idx="1"/>
+            <a:endCxn id="11" idx="3"/>
+          </p:cNvCxnSpPr>
+          <p:nvPr/>
+        </p:nvCxnSpPr>
+        <p:spPr>
+          <a:xfrm flipH="1">
+            <a:off x="5370022" y="5099256"/>
+            <a:ext cx="3161607" cy="1"/>
+          </a:xfrm>
+          <a:prstGeom prst="straightConnector1">
+            <a:avLst/>
+          </a:prstGeom>
+          <a:ln w="12700">
+            <a:tailEnd type="triangle"/>
+          </a:ln>
+        </p:spPr>
+        <p:style>
+          <a:lnRef idx="1">
+            <a:schemeClr val="dk1"/>
+          </a:lnRef>
+          <a:fillRef idx="0">
+            <a:schemeClr val="dk1"/>
+          </a:fillRef>
+          <a:effectRef idx="0">
+            <a:schemeClr val="dk1"/>
+          </a:effectRef>
+          <a:fontRef idx="minor">
+            <a:schemeClr val="tx1"/>
+          </a:fontRef>
+        </p:style>
+      </p:cxnSp>
+      <p:cxnSp>
+        <p:nvCxnSpPr>
+          <p:cNvPr id="43" name="Straight Arrow Connector 42"/>
+          <p:cNvCxnSpPr>
+            <a:stCxn id="30" idx="1"/>
+            <a:endCxn id="13" idx="3"/>
+          </p:cNvCxnSpPr>
+          <p:nvPr/>
+        </p:nvCxnSpPr>
+        <p:spPr>
+          <a:xfrm flipH="1">
+            <a:off x="6525491" y="5579408"/>
+            <a:ext cx="2006138" cy="0"/>
+          </a:xfrm>
+          <a:prstGeom prst="straightConnector1">
+            <a:avLst/>
+          </a:prstGeom>
+          <a:ln w="12700">
+            <a:tailEnd type="triangle"/>
+          </a:ln>
+        </p:spPr>
+        <p:style>
+          <a:lnRef idx="1">
+            <a:schemeClr val="dk1"/>
+          </a:lnRef>
+          <a:fillRef idx="0">
+            <a:schemeClr val="dk1"/>
+          </a:fillRef>
+          <a:effectRef idx="0">
+            <a:schemeClr val="dk1"/>
+          </a:effectRef>
+          <a:fontRef idx="minor">
+            <a:schemeClr val="tx1"/>
+          </a:fontRef>
+        </p:style>
+      </p:cxnSp>
+      <p:sp>
+        <p:nvSpPr>
+          <p:cNvPr id="47" name="Rounded Rectangle 46"/>
+          <p:cNvSpPr/>
+          <p:nvPr/>
+        </p:nvSpPr>
+        <p:spPr>
+          <a:xfrm>
+            <a:off x="3966902" y="6185035"/>
+            <a:ext cx="3961708" cy="332506"/>
+          </a:xfrm>
+          <a:prstGeom prst="roundRect">
+            <a:avLst/>
+          </a:prstGeom>
+        </p:spPr>
+        <p:style>
+          <a:lnRef idx="2">
+            <a:schemeClr val="dk1">
+              <a:shade val="50000"/>
+            </a:schemeClr>
+          </a:lnRef>
+          <a:fillRef idx="1">
+            <a:schemeClr val="dk1"/>
+          </a:fillRef>
+          <a:effectRef idx="0">
+            <a:schemeClr val="dk1"/>
+          </a:effectRef>
+          <a:fontRef idx="minor">
+            <a:schemeClr val="lt1"/>
+          </a:fontRef>
+        </p:style>
+        <p:txBody>
+          <a:bodyPr rtlCol="0" anchor="ctr"/>
+          <a:lstStyle/>
+          <a:p>
+            <a:pPr algn="ctr"/>
+            <a:r>
+              <a:rPr lang="ru-RU" dirty="0" smtClean="0"/>
+              <a:t>Хотим сделать запись в этот файл</a:t>
+            </a:r>
+            <a:endParaRPr lang="en-US" dirty="0" smtClean="0"/>
+          </a:p>
+        </p:txBody>
+      </p:sp>
+      <p:cxnSp>
+        <p:nvCxnSpPr>
+          <p:cNvPr id="48" name="Straight Arrow Connector 47"/>
+          <p:cNvCxnSpPr>
+            <a:stCxn id="47" idx="0"/>
+            <a:endCxn id="13" idx="2"/>
+          </p:cNvCxnSpPr>
+          <p:nvPr/>
+        </p:nvCxnSpPr>
+        <p:spPr>
+          <a:xfrm flipV="1">
+            <a:off x="5947756" y="5712411"/>
+            <a:ext cx="1" cy="472624"/>
+          </a:xfrm>
+          <a:prstGeom prst="straightConnector1">
+            <a:avLst/>
+          </a:prstGeom>
+          <a:ln w="12700">
+            <a:tailEnd type="triangle"/>
+          </a:ln>
+        </p:spPr>
+        <p:style>
+          <a:lnRef idx="1">
+            <a:schemeClr val="dk1"/>
+          </a:lnRef>
+          <a:fillRef idx="0">
+            <a:schemeClr val="dk1"/>
+          </a:fillRef>
+          <a:effectRef idx="0">
+            <a:schemeClr val="dk1"/>
+          </a:effectRef>
+          <a:fontRef idx="minor">
+            <a:schemeClr val="tx1"/>
+          </a:fontRef>
+        </p:style>
+      </p:cxnSp>
     </p:spTree>
     <p:extLst>
       <p:ext uri="{BB962C8B-B14F-4D97-AF65-F5344CB8AC3E}">
@@ -23164,6 +24506,13 @@
   <p:clrMapOvr>
     <a:masterClrMapping/>
   </p:clrMapOvr>
+  <p:timing>
+    <p:tnLst>
+      <p:par>
+        <p:cTn id="1" dur="indefinite" restart="never" nodeType="tmRoot"/>
+      </p:par>
+    </p:tnLst>
+  </p:timing>
 </p:sld>
 </file>
 
@@ -23306,16 +24655,12 @@
             <a:graphicFrameLocks noGrp="1"/>
           </p:cNvGraphicFramePr>
           <p:nvPr>
-            <p:extLst>
-              <p:ext uri="{D42A27DB-BD31-4B8C-83A1-F6EECF244321}">
-                <p14:modId xmlns:p14="http://schemas.microsoft.com/office/powerpoint/2010/main" val="2583932790"/>
-              </p:ext>
-            </p:extLst>
+            <p:extLst/>
           </p:nvPr>
         </p:nvGraphicFramePr>
         <p:xfrm>
           <a:off x="0" y="365760"/>
-          <a:ext cx="12192000" cy="5212080"/>
+          <a:ext cx="12192000" cy="6035040"/>
         </p:xfrm>
         <a:graphic>
           <a:graphicData uri="http://schemas.openxmlformats.org/drawingml/2006/table">
@@ -23339,9 +24684,10 @@
                     <a:lstStyle/>
                     <a:p>
                       <a:r>
-                        <a:rPr lang="ru-RU" sz="2400" dirty="0"/>
-                        <a:t>Стратегии сбора мусора</a:t>
-                      </a:r>
+                        <a:rPr lang="en-US" sz="2400" dirty="0"/>
+                        <a:t>Wandering tree problem</a:t>
+                      </a:r>
+                      <a:endParaRPr lang="ru-RU" sz="2400" dirty="0"/>
                     </a:p>
                   </a:txBody>
                   <a:tcPr/>
@@ -23358,73 +24704,160 @@
                     <a:bodyPr/>
                     <a:lstStyle/>
                     <a:p>
-                      <a:pPr marL="342900" indent="-342900">
-                        <a:buFont typeface="+mj-lt"/>
-                        <a:buAutoNum type="arabicPeriod"/>
-                      </a:pPr>
                       <a:r>
                         <a:rPr lang="ru-RU" dirty="0">
                           <a:solidFill>
                             <a:schemeClr val="tx1"/>
                           </a:solidFill>
                         </a:rPr>
-                        <a:t>Как выбирать сегменты, в которых собрать мусор?</a:t>
-                      </a:r>
-                    </a:p>
-                    <a:p>
-                      <a:pPr marL="742950" lvl="1" indent="-285750">
-                        <a:buFont typeface="Arial" panose="020B0604020202020204" pitchFamily="34" charset="0"/>
-                        <a:buChar char="•"/>
-                      </a:pPr>
+                        <a:t>Как реализовать </a:t>
+                      </a:r>
+                      <a:r>
+                        <a:rPr lang="en-US" dirty="0" err="1">
+                          <a:solidFill>
+                            <a:schemeClr val="tx1"/>
+                          </a:solidFill>
+                        </a:rPr>
+                        <a:t>fsync</a:t>
+                      </a:r>
+                      <a:r>
+                        <a:rPr lang="en-US" dirty="0">
+                          <a:solidFill>
+                            <a:schemeClr val="tx1"/>
+                          </a:solidFill>
+                        </a:rPr>
+                        <a:t>() </a:t>
+                      </a:r>
                       <a:r>
                         <a:rPr lang="ru-RU" dirty="0">
                           <a:solidFill>
                             <a:schemeClr val="tx1"/>
                           </a:solidFill>
                         </a:rPr>
-                        <a:t>убирать мусор из тех сегментов, где его больше всего,</a:t>
-                      </a:r>
-                    </a:p>
-                    <a:p>
-                      <a:pPr marL="742950" lvl="1" indent="-285750">
-                        <a:buFont typeface="Arial" panose="020B0604020202020204" pitchFamily="34" charset="0"/>
-                        <a:buChar char="•"/>
-                      </a:pPr>
+                        <a:t>на отдельный файл в </a:t>
+                      </a:r>
+                      <a:r>
+                        <a:rPr lang="en-US" dirty="0">
+                          <a:solidFill>
+                            <a:schemeClr val="tx1"/>
+                          </a:solidFill>
+                        </a:rPr>
+                        <a:t>LFS? – </a:t>
+                      </a:r>
                       <a:r>
                         <a:rPr lang="ru-RU" dirty="0">
                           <a:solidFill>
                             <a:schemeClr val="tx1"/>
                           </a:solidFill>
                         </a:rPr>
-                        <a:t>убирать мусор из наиболее фрагментированных сегментов.</a:t>
-                      </a:r>
-                    </a:p>
-                    <a:p>
-                      <a:pPr marL="342900" indent="-342900">
-                        <a:buFont typeface="+mj-lt"/>
-                        <a:buAutoNum type="arabicPeriod"/>
-                      </a:pPr>
+                        <a:t>Записать целую транзакцию в журнал.</a:t>
+                      </a:r>
+                    </a:p>
+                    <a:p>
+                      <a:endParaRPr lang="ru-RU" dirty="0">
+                        <a:solidFill>
+                          <a:schemeClr val="tx1"/>
+                        </a:solidFill>
+                      </a:endParaRPr>
+                    </a:p>
+                    <a:p>
+                      <a:r>
+                        <a:rPr lang="ru-RU" b="1" dirty="0">
+                          <a:solidFill>
+                            <a:schemeClr val="tx1"/>
+                          </a:solidFill>
+                        </a:rPr>
+                        <a:t>Проблема:</a:t>
+                      </a:r>
                       <a:r>
                         <a:rPr lang="ru-RU" dirty="0">
                           <a:solidFill>
                             <a:schemeClr val="tx1"/>
                           </a:solidFill>
                         </a:rPr>
-                        <a:t>Как перегруппировывать данные из сегментов?</a:t>
-                      </a:r>
-                    </a:p>
-                    <a:p>
-                      <a:pPr marL="800100" lvl="1" indent="-342900">
-                        <a:buFont typeface="Arial" panose="020B0604020202020204" pitchFamily="34" charset="0"/>
-                        <a:buChar char="•"/>
-                      </a:pPr>
+                        <a:t> приложения вроде </a:t>
+                      </a:r>
+                      <a:r>
+                        <a:rPr lang="en-US" dirty="0">
+                          <a:solidFill>
+                            <a:schemeClr val="tx1"/>
+                          </a:solidFill>
+                        </a:rPr>
+                        <a:t>SQLite </a:t>
+                      </a:r>
                       <a:r>
                         <a:rPr lang="ru-RU" dirty="0">
                           <a:solidFill>
                             <a:schemeClr val="tx1"/>
                           </a:solidFill>
                         </a:rPr>
-                        <a:t>хватит ли просто сливать несколько фрагментированных сегментов в один?</a:t>
+                        <a:t>часто вызывают </a:t>
+                      </a:r>
+                      <a:r>
+                        <a:rPr lang="en-US" dirty="0" err="1">
+                          <a:solidFill>
+                            <a:schemeClr val="tx1"/>
+                          </a:solidFill>
+                        </a:rPr>
+                        <a:t>fsync</a:t>
+                      </a:r>
+                      <a:r>
+                        <a:rPr lang="en-US" dirty="0">
+                          <a:solidFill>
+                            <a:schemeClr val="tx1"/>
+                          </a:solidFill>
+                        </a:rPr>
+                        <a:t>() </a:t>
+                      </a:r>
+                      <a:r>
+                        <a:rPr lang="ru-RU" dirty="0">
+                          <a:solidFill>
+                            <a:schemeClr val="tx1"/>
+                          </a:solidFill>
+                        </a:rPr>
+                        <a:t>после записи небольшой порции данных.</a:t>
+                      </a:r>
+                    </a:p>
+                    <a:p>
+                      <a:r>
+                        <a:rPr lang="ru-RU" dirty="0">
+                          <a:solidFill>
+                            <a:schemeClr val="tx1"/>
+                          </a:solidFill>
+                        </a:rPr>
+                        <a:t>Что будет происходить с журналом </a:t>
+                      </a:r>
+                      <a:r>
+                        <a:rPr lang="en-US" dirty="0">
+                          <a:solidFill>
+                            <a:schemeClr val="tx1"/>
+                          </a:solidFill>
+                        </a:rPr>
+                        <a:t>LFS </a:t>
+                      </a:r>
+                      <a:r>
+                        <a:rPr lang="ru-RU" dirty="0">
+                          <a:solidFill>
+                            <a:schemeClr val="tx1"/>
+                          </a:solidFill>
+                        </a:rPr>
+                        <a:t>в такой ситуации</a:t>
+                      </a:r>
+                      <a:r>
+                        <a:rPr lang="en-US" dirty="0">
+                          <a:solidFill>
+                            <a:schemeClr val="tx1"/>
+                          </a:solidFill>
+                        </a:rPr>
+                        <a:t>? </a:t>
+                      </a:r>
+                      <a:r>
+                        <a:rPr lang="ru-RU" dirty="0">
+                          <a:solidFill>
+                            <a:schemeClr val="tx1"/>
+                          </a:solidFill>
+                        </a:rPr>
+                        <a:t>– В нём будут появляться много коротких транзакций и размер метаданных ФС станет сопоставим (или больше) с размером пользовательских данных.</a:t>
                       </a:r>
                       <a:endParaRPr lang="en-US" dirty="0">
                         <a:solidFill>
@@ -23433,7 +24866,117 @@
                       </a:endParaRPr>
                     </a:p>
                     <a:p>
-                      <a:pPr marL="800100" lvl="1" indent="-342900">
+                      <a:endParaRPr lang="en-US" dirty="0">
+                        <a:solidFill>
+                          <a:schemeClr val="tx1"/>
+                        </a:solidFill>
+                      </a:endParaRPr>
+                    </a:p>
+                    <a:p>
+                      <a:r>
+                        <a:rPr lang="ru-RU" dirty="0">
+                          <a:solidFill>
+                            <a:schemeClr val="tx1"/>
+                          </a:solidFill>
+                        </a:rPr>
+                        <a:t>Источники накладных расходов: помимо пользовательских данных и </a:t>
+                      </a:r>
+                      <a:r>
+                        <a:rPr lang="ru-RU" dirty="0" err="1">
+                          <a:solidFill>
+                            <a:schemeClr val="tx1"/>
+                          </a:solidFill>
+                        </a:rPr>
+                        <a:t>иноды</a:t>
+                      </a:r>
+                      <a:r>
+                        <a:rPr lang="ru-RU" dirty="0">
+                          <a:solidFill>
+                            <a:schemeClr val="tx1"/>
+                          </a:solidFill>
+                        </a:rPr>
+                        <a:t> в журнал надо записать содержимое</a:t>
+                      </a:r>
+                    </a:p>
+                    <a:p>
+                      <a:pPr marL="285750" indent="-285750">
+                        <a:buFont typeface="Arial" panose="020B0604020202020204" pitchFamily="34" charset="0"/>
+                        <a:buChar char="•"/>
+                      </a:pPr>
+                      <a:r>
+                        <a:rPr lang="ru-RU" dirty="0">
+                          <a:solidFill>
+                            <a:schemeClr val="tx1"/>
+                          </a:solidFill>
+                        </a:rPr>
+                        <a:t>Каталога, содержащего изменившийся файл, и его </a:t>
+                      </a:r>
+                      <a:r>
+                        <a:rPr lang="ru-RU" dirty="0" err="1">
+                          <a:solidFill>
+                            <a:schemeClr val="tx1"/>
+                          </a:solidFill>
+                        </a:rPr>
+                        <a:t>иноду</a:t>
+                      </a:r>
+                      <a:r>
+                        <a:rPr lang="ru-RU" dirty="0">
+                          <a:solidFill>
+                            <a:schemeClr val="tx1"/>
+                          </a:solidFill>
+                        </a:rPr>
+                        <a:t>,</a:t>
+                      </a:r>
+                    </a:p>
+                    <a:p>
+                      <a:pPr marL="285750" indent="-285750">
+                        <a:buFont typeface="Arial" panose="020B0604020202020204" pitchFamily="34" charset="0"/>
+                        <a:buChar char="•"/>
+                      </a:pPr>
+                      <a:r>
+                        <a:rPr lang="ru-RU" dirty="0">
+                          <a:solidFill>
+                            <a:schemeClr val="tx1"/>
+                          </a:solidFill>
+                        </a:rPr>
+                        <a:t>и так до корня по всему пути к файлу,</a:t>
+                      </a:r>
+                    </a:p>
+                    <a:p>
+                      <a:pPr marL="285750" indent="-285750">
+                        <a:buFont typeface="Arial" panose="020B0604020202020204" pitchFamily="34" charset="0"/>
+                        <a:buChar char="•"/>
+                      </a:pPr>
+                      <a:r>
+                        <a:rPr lang="en-US" dirty="0">
+                          <a:solidFill>
+                            <a:schemeClr val="tx1"/>
+                          </a:solidFill>
+                        </a:rPr>
+                        <a:t>segment summary block,</a:t>
+                      </a:r>
+                    </a:p>
+                    <a:p>
+                      <a:pPr marL="285750" indent="-285750">
+                        <a:buFont typeface="Arial" panose="020B0604020202020204" pitchFamily="34" charset="0"/>
+                        <a:buChar char="•"/>
+                      </a:pPr>
+                      <a:r>
+                        <a:rPr lang="ru-RU" dirty="0">
+                          <a:solidFill>
+                            <a:schemeClr val="tx1"/>
+                          </a:solidFill>
+                        </a:rPr>
+                        <a:t>заголовок транзакции.</a:t>
+                      </a:r>
+                      <a:endParaRPr lang="en-US" dirty="0">
+                        <a:solidFill>
+                          <a:schemeClr val="tx1"/>
+                        </a:solidFill>
+                      </a:endParaRPr>
+                    </a:p>
+                    <a:p>
+                      <a:pPr marL="285750" indent="-285750">
                         <a:buFont typeface="Arial" panose="020B0604020202020204" pitchFamily="34" charset="0"/>
                         <a:buChar char="•"/>
                       </a:pPr>
@@ -23444,125 +24987,207 @@
                       </a:endParaRPr>
                     </a:p>
                     <a:p>
-                      <a:pPr marL="800100" lvl="1" indent="-342900">
+                      <a:pPr marL="0" indent="0">
                         <a:buFont typeface="Arial" panose="020B0604020202020204" pitchFamily="34" charset="0"/>
-                        <a:buChar char="•"/>
+                        <a:buNone/>
                       </a:pPr>
-                      <a:endParaRPr lang="en-US" dirty="0">
+                      <a:r>
+                        <a:rPr lang="ru-RU" dirty="0">
+                          <a:solidFill>
+                            <a:schemeClr val="tx1"/>
+                          </a:solidFill>
+                        </a:rPr>
+                        <a:t>В </a:t>
+                      </a:r>
+                      <a:r>
+                        <a:rPr lang="en-US" dirty="0">
+                          <a:solidFill>
+                            <a:schemeClr val="tx1"/>
+                          </a:solidFill>
+                        </a:rPr>
+                        <a:t>F2FS</a:t>
+                      </a:r>
+                      <a:r>
+                        <a:rPr lang="ru-RU" dirty="0">
+                          <a:solidFill>
+                            <a:schemeClr val="tx1"/>
+                          </a:solidFill>
+                        </a:rPr>
+                        <a:t> при </a:t>
+                      </a:r>
+                      <a:r>
+                        <a:rPr lang="en-US" dirty="0" err="1">
+                          <a:solidFill>
+                            <a:schemeClr val="tx1"/>
+                          </a:solidFill>
+                        </a:rPr>
+                        <a:t>fsync</a:t>
+                      </a:r>
+                      <a:r>
+                        <a:rPr lang="en-US" dirty="0">
+                          <a:solidFill>
+                            <a:schemeClr val="tx1"/>
+                          </a:solidFill>
+                        </a:rPr>
+                        <a:t>() </a:t>
+                      </a:r>
+                      <a:r>
+                        <a:rPr lang="ru-RU" dirty="0">
+                          <a:solidFill>
+                            <a:schemeClr val="tx1"/>
+                          </a:solidFill>
+                        </a:rPr>
+                        <a:t>на отдельный файл в журнал выписываются только блоки данных файла и его </a:t>
+                      </a:r>
+                      <a:r>
+                        <a:rPr lang="ru-RU" dirty="0" err="1">
+                          <a:solidFill>
+                            <a:schemeClr val="tx1"/>
+                          </a:solidFill>
+                        </a:rPr>
+                        <a:t>инода</a:t>
+                      </a:r>
+                      <a:r>
+                        <a:rPr lang="ru-RU" dirty="0">
+                          <a:solidFill>
+                            <a:schemeClr val="tx1"/>
+                          </a:solidFill>
+                        </a:rPr>
+                        <a:t>, а длина этой записи сохраняется в </a:t>
+                      </a:r>
+                      <a:r>
+                        <a:rPr lang="en-US" dirty="0">
+                          <a:solidFill>
+                            <a:schemeClr val="tx1"/>
+                          </a:solidFill>
+                        </a:rPr>
+                        <a:t>checkpoint region (</a:t>
+                      </a:r>
+                      <a:r>
+                        <a:rPr lang="ru-RU" dirty="0">
+                          <a:solidFill>
+                            <a:schemeClr val="tx1"/>
+                          </a:solidFill>
+                        </a:rPr>
+                        <a:t>не путать с указателем на голову транзакции!). Позже, при записи транзакции она форматируется так, чтобы выписанные при </a:t>
+                      </a:r>
+                      <a:r>
+                        <a:rPr lang="en-US" dirty="0" err="1">
+                          <a:solidFill>
+                            <a:schemeClr val="tx1"/>
+                          </a:solidFill>
+                        </a:rPr>
+                        <a:t>fsync</a:t>
+                      </a:r>
+                      <a:r>
+                        <a:rPr lang="en-US" dirty="0">
+                          <a:solidFill>
+                            <a:schemeClr val="tx1"/>
+                          </a:solidFill>
+                        </a:rPr>
+                        <a:t>() </a:t>
+                      </a:r>
+                      <a:r>
+                        <a:rPr lang="ru-RU" dirty="0">
+                          <a:solidFill>
+                            <a:schemeClr val="tx1"/>
+                          </a:solidFill>
+                        </a:rPr>
+                        <a:t>блоки данных составляли часть транзакции.</a:t>
+                      </a:r>
+                    </a:p>
+                    <a:p>
+                      <a:pPr marL="0" indent="0">
+                        <a:buFont typeface="Arial" panose="020B0604020202020204" pitchFamily="34" charset="0"/>
+                        <a:buNone/>
+                      </a:pPr>
+                      <a:endParaRPr lang="ru-RU" dirty="0">
                         <a:solidFill>
                           <a:schemeClr val="tx1"/>
                         </a:solidFill>
                       </a:endParaRPr>
                     </a:p>
                     <a:p>
-                      <a:pPr marL="800100" lvl="1" indent="-342900">
+                      <a:pPr marL="0" indent="0">
+                        <a:buFont typeface="Arial" panose="020B0604020202020204" pitchFamily="34" charset="0"/>
+                        <a:buNone/>
+                      </a:pPr>
+                      <a:r>
+                        <a:rPr lang="ru-RU" dirty="0">
+                          <a:solidFill>
+                            <a:schemeClr val="tx1"/>
+                          </a:solidFill>
+                        </a:rPr>
+                        <a:t>Такое решение требует </a:t>
+                      </a:r>
+                      <a:r>
+                        <a:rPr lang="en-US" b="1" dirty="0">
+                          <a:solidFill>
+                            <a:schemeClr val="tx1"/>
+                          </a:solidFill>
+                        </a:rPr>
+                        <a:t>roll forward</a:t>
+                      </a:r>
+                      <a:r>
+                        <a:rPr lang="en-US" dirty="0">
+                          <a:solidFill>
+                            <a:schemeClr val="tx1"/>
+                          </a:solidFill>
+                        </a:rPr>
+                        <a:t> </a:t>
+                      </a:r>
+                      <a:r>
+                        <a:rPr lang="ru-RU" dirty="0">
+                          <a:solidFill>
+                            <a:schemeClr val="tx1"/>
+                          </a:solidFill>
+                        </a:rPr>
+                        <a:t>при монтировании файловой системы: после нахождения последней успешно применённой транзакции</a:t>
+                      </a:r>
+                      <a:r>
+                        <a:rPr lang="en-US" dirty="0">
+                          <a:solidFill>
+                            <a:schemeClr val="tx1"/>
+                          </a:solidFill>
+                        </a:rPr>
+                        <a:t> </a:t>
+                      </a:r>
+                      <a:r>
+                        <a:rPr lang="ru-RU" dirty="0">
+                          <a:solidFill>
+                            <a:schemeClr val="tx1"/>
+                          </a:solidFill>
+                        </a:rPr>
+                        <a:t>ФС должна</a:t>
+                      </a:r>
+                    </a:p>
+                    <a:p>
+                      <a:pPr marL="342900" indent="-342900">
                         <a:buFont typeface="Arial" panose="020B0604020202020204" pitchFamily="34" charset="0"/>
                         <a:buChar char="•"/>
                       </a:pPr>
-                      <a:endParaRPr lang="en-US" dirty="0">
-                        <a:solidFill>
-                          <a:schemeClr val="tx1"/>
-                        </a:solidFill>
-                      </a:endParaRPr>
-                    </a:p>
-                    <a:p>
-                      <a:pPr marL="800100" lvl="1" indent="-342900">
+                      <a:r>
+                        <a:rPr lang="ru-RU" dirty="0">
+                          <a:solidFill>
+                            <a:schemeClr val="tx1"/>
+                          </a:solidFill>
+                        </a:rPr>
+                        <a:t>применить изменения в страницах данных из неполной транзакции,</a:t>
+                      </a:r>
+                    </a:p>
+                    <a:p>
+                      <a:pPr marL="342900" indent="-342900">
                         <a:buFont typeface="Arial" panose="020B0604020202020204" pitchFamily="34" charset="0"/>
                         <a:buChar char="•"/>
                       </a:pPr>
-                      <a:endParaRPr lang="en-US" dirty="0">
-                        <a:solidFill>
-                          <a:schemeClr val="tx1"/>
-                        </a:solidFill>
-                      </a:endParaRPr>
-                    </a:p>
-                    <a:p>
-                      <a:pPr marL="800100" lvl="1" indent="-342900">
-                        <a:buFont typeface="Arial" panose="020B0604020202020204" pitchFamily="34" charset="0"/>
-                        <a:buChar char="•"/>
-                      </a:pPr>
-                      <a:endParaRPr lang="en-US" dirty="0">
-                        <a:solidFill>
-                          <a:schemeClr val="tx1"/>
-                        </a:solidFill>
-                      </a:endParaRPr>
-                    </a:p>
-                    <a:p>
-                      <a:pPr marL="800100" lvl="1" indent="-342900">
-                        <a:buFont typeface="Arial" panose="020B0604020202020204" pitchFamily="34" charset="0"/>
-                        <a:buChar char="•"/>
-                      </a:pPr>
-                      <a:endParaRPr lang="en-US" dirty="0">
-                        <a:solidFill>
-                          <a:schemeClr val="tx1"/>
-                        </a:solidFill>
-                      </a:endParaRPr>
-                    </a:p>
-                    <a:p>
-                      <a:pPr marL="800100" lvl="1" indent="-342900">
-                        <a:buFont typeface="Arial" panose="020B0604020202020204" pitchFamily="34" charset="0"/>
-                        <a:buChar char="•"/>
-                      </a:pPr>
-                      <a:endParaRPr lang="en-US" dirty="0">
-                        <a:solidFill>
-                          <a:schemeClr val="tx1"/>
-                        </a:solidFill>
-                      </a:endParaRPr>
-                    </a:p>
-                    <a:p>
-                      <a:pPr marL="800100" lvl="1" indent="-342900">
-                        <a:buFont typeface="Arial" panose="020B0604020202020204" pitchFamily="34" charset="0"/>
-                        <a:buChar char="•"/>
-                      </a:pPr>
-                      <a:endParaRPr lang="en-US" dirty="0">
-                        <a:solidFill>
-                          <a:schemeClr val="tx1"/>
-                        </a:solidFill>
-                      </a:endParaRPr>
-                    </a:p>
-                    <a:p>
-                      <a:pPr marL="800100" lvl="1" indent="-342900">
-                        <a:buFont typeface="Arial" panose="020B0604020202020204" pitchFamily="34" charset="0"/>
-                        <a:buChar char="•"/>
-                      </a:pPr>
-                      <a:endParaRPr lang="en-US" dirty="0">
-                        <a:solidFill>
-                          <a:schemeClr val="tx1"/>
-                        </a:solidFill>
-                      </a:endParaRPr>
-                    </a:p>
-                    <a:p>
-                      <a:pPr marL="800100" lvl="1" indent="-342900">
-                        <a:buFont typeface="Arial" panose="020B0604020202020204" pitchFamily="34" charset="0"/>
-                        <a:buChar char="•"/>
-                      </a:pPr>
-                      <a:endParaRPr lang="en-US" dirty="0">
-                        <a:solidFill>
-                          <a:schemeClr val="tx1"/>
-                        </a:solidFill>
-                      </a:endParaRPr>
-                    </a:p>
-                    <a:p>
-                      <a:pPr marL="800100" lvl="1" indent="-342900">
-                        <a:buFont typeface="Arial" panose="020B0604020202020204" pitchFamily="34" charset="0"/>
-                        <a:buChar char="•"/>
-                      </a:pPr>
-                      <a:endParaRPr lang="en-US" dirty="0">
-                        <a:solidFill>
-                          <a:schemeClr val="tx1"/>
-                        </a:solidFill>
-                      </a:endParaRPr>
-                    </a:p>
-                    <a:p>
-                      <a:pPr marL="800100" lvl="1" indent="-342900">
-                        <a:buFont typeface="Arial" panose="020B0604020202020204" pitchFamily="34" charset="0"/>
-                        <a:buChar char="•"/>
-                      </a:pPr>
-                      <a:endParaRPr lang="en-US" dirty="0">
-                        <a:solidFill>
-                          <a:schemeClr val="tx1"/>
-                        </a:solidFill>
-                      </a:endParaRPr>
+                      <a:r>
+                        <a:rPr lang="ru-RU" dirty="0">
+                          <a:solidFill>
+                            <a:schemeClr val="tx1"/>
+                          </a:solidFill>
+                        </a:rPr>
+                        <a:t>дописать транзакцию до полной.</a:t>
+                      </a:r>
                     </a:p>
                   </a:txBody>
                   <a:tcPr/>
@@ -23580,13 +25205,20 @@
     </p:spTree>
     <p:extLst>
       <p:ext uri="{BB962C8B-B14F-4D97-AF65-F5344CB8AC3E}">
-        <p14:creationId xmlns:p14="http://schemas.microsoft.com/office/powerpoint/2010/main" val="3571833104"/>
+        <p14:creationId xmlns:p14="http://schemas.microsoft.com/office/powerpoint/2010/main" val="3256548144"/>
       </p:ext>
     </p:extLst>
   </p:cSld>
   <p:clrMapOvr>
     <a:masterClrMapping/>
   </p:clrMapOvr>
+  <p:timing>
+    <p:tnLst>
+      <p:par>
+        <p:cTn id="1" dur="indefinite" restart="never" nodeType="tmRoot"/>
+      </p:par>
+    </p:tnLst>
+  </p:timing>
 </p:sld>
 </file>
 
@@ -23731,7 +25363,7 @@
           <p:nvPr>
             <p:extLst>
               <p:ext uri="{D42A27DB-BD31-4B8C-83A1-F6EECF244321}">
-                <p14:modId xmlns:p14="http://schemas.microsoft.com/office/powerpoint/2010/main" val="1524602510"/>
+                <p14:modId xmlns:p14="http://schemas.microsoft.com/office/powerpoint/2010/main" val="2583932790"/>
               </p:ext>
             </p:extLst>
           </p:nvPr>
@@ -23849,31 +25481,6 @@
                         </a:rPr>
                         <a:t>хватит ли просто сливать несколько фрагментированных сегментов в один?</a:t>
                       </a:r>
-                    </a:p>
-                    <a:p>
-                      <a:pPr marL="800100" lvl="1" indent="-342900">
-                        <a:buFont typeface="Arial" panose="020B0604020202020204" pitchFamily="34" charset="0"/>
-                        <a:buChar char="•"/>
-                      </a:pPr>
-                      <a:endParaRPr lang="ru-RU" dirty="0">
-                        <a:solidFill>
-                          <a:schemeClr val="tx1"/>
-                        </a:solidFill>
-                      </a:endParaRPr>
-                    </a:p>
-                    <a:p>
-                      <a:pPr marL="0" lvl="0" indent="0">
-                        <a:buFont typeface="Arial" panose="020B0604020202020204" pitchFamily="34" charset="0"/>
-                        <a:buNone/>
-                      </a:pPr>
-                      <a:r>
-                        <a:rPr lang="ru-RU" dirty="0">
-                          <a:solidFill>
-                            <a:schemeClr val="tx1"/>
-                          </a:solidFill>
-                        </a:rPr>
-                        <a:t>Наблюдение:</a:t>
-                      </a:r>
                       <a:endParaRPr lang="en-US" dirty="0">
                         <a:solidFill>
                           <a:schemeClr val="tx1"/>
@@ -23881,58 +25488,7 @@
                       </a:endParaRPr>
                     </a:p>
                     <a:p>
-                      <a:pPr marL="285750" lvl="0" indent="-285750">
-                        <a:buFont typeface="Arial" panose="020B0604020202020204" pitchFamily="34" charset="0"/>
-                        <a:buChar char="•"/>
-                      </a:pPr>
-                      <a:r>
-                        <a:rPr lang="ru-RU" dirty="0">
-                          <a:solidFill>
-                            <a:schemeClr val="tx1"/>
-                          </a:solidFill>
-                        </a:rPr>
-                        <a:t>Если просто объединять сегменты, в которых оказалось много незанятого места (например, </a:t>
-                      </a:r>
-                      <a:r>
-                        <a:rPr lang="en-US" dirty="0">
-                          <a:solidFill>
-                            <a:schemeClr val="tx1"/>
-                          </a:solidFill>
-                        </a:rPr>
-                        <a:t>&gt;= 50%)</a:t>
-                      </a:r>
-                      <a:r>
-                        <a:rPr lang="ru-RU" dirty="0">
-                          <a:solidFill>
-                            <a:schemeClr val="tx1"/>
-                          </a:solidFill>
-                        </a:rPr>
-                        <a:t>, в один, то мы получаем большой </a:t>
-                      </a:r>
-                      <a:r>
-                        <a:rPr lang="en-US" dirty="0">
-                          <a:solidFill>
-                            <a:schemeClr val="tx1"/>
-                          </a:solidFill>
-                        </a:rPr>
-                        <a:t>write amplification: </a:t>
-                      </a:r>
-                      <a:r>
-                        <a:rPr lang="ru-RU" dirty="0">
-                          <a:solidFill>
-                            <a:schemeClr val="tx1"/>
-                          </a:solidFill>
-                        </a:rPr>
-                        <a:t>одни и те же данные приходится копировать во многих циклах сборки мусора.</a:t>
-                      </a:r>
-                      <a:endParaRPr lang="en-US" dirty="0">
-                        <a:solidFill>
-                          <a:schemeClr val="tx1"/>
-                        </a:solidFill>
-                      </a:endParaRPr>
-                    </a:p>
-                    <a:p>
-                      <a:pPr marL="285750" lvl="0" indent="-285750">
+                      <a:pPr marL="800100" lvl="1" indent="-342900">
                         <a:buFont typeface="Arial" panose="020B0604020202020204" pitchFamily="34" charset="0"/>
                         <a:buChar char="•"/>
                       </a:pPr>
@@ -23943,7 +25499,7 @@
                       </a:endParaRPr>
                     </a:p>
                     <a:p>
-                      <a:pPr marL="285750" lvl="0" indent="-285750">
+                      <a:pPr marL="800100" lvl="1" indent="-342900">
                         <a:buFont typeface="Arial" panose="020B0604020202020204" pitchFamily="34" charset="0"/>
                         <a:buChar char="•"/>
                       </a:pPr>
@@ -23954,7 +25510,7 @@
                       </a:endParaRPr>
                     </a:p>
                     <a:p>
-                      <a:pPr marL="285750" lvl="0" indent="-285750">
+                      <a:pPr marL="800100" lvl="1" indent="-342900">
                         <a:buFont typeface="Arial" panose="020B0604020202020204" pitchFamily="34" charset="0"/>
                         <a:buChar char="•"/>
                       </a:pPr>
@@ -23965,7 +25521,7 @@
                       </a:endParaRPr>
                     </a:p>
                     <a:p>
-                      <a:pPr marL="285750" lvl="0" indent="-285750">
+                      <a:pPr marL="800100" lvl="1" indent="-342900">
                         <a:buFont typeface="Arial" panose="020B0604020202020204" pitchFamily="34" charset="0"/>
                         <a:buChar char="•"/>
                       </a:pPr>
@@ -23976,7 +25532,7 @@
                       </a:endParaRPr>
                     </a:p>
                     <a:p>
-                      <a:pPr marL="285750" lvl="0" indent="-285750">
+                      <a:pPr marL="800100" lvl="1" indent="-342900">
                         <a:buFont typeface="Arial" panose="020B0604020202020204" pitchFamily="34" charset="0"/>
                         <a:buChar char="•"/>
                       </a:pPr>
@@ -23987,7 +25543,7 @@
                       </a:endParaRPr>
                     </a:p>
                     <a:p>
-                      <a:pPr marL="285750" lvl="0" indent="-285750">
+                      <a:pPr marL="800100" lvl="1" indent="-342900">
                         <a:buFont typeface="Arial" panose="020B0604020202020204" pitchFamily="34" charset="0"/>
                         <a:buChar char="•"/>
                       </a:pPr>
@@ -23998,7 +25554,7 @@
                       </a:endParaRPr>
                     </a:p>
                     <a:p>
-                      <a:pPr marL="285750" lvl="0" indent="-285750">
+                      <a:pPr marL="800100" lvl="1" indent="-342900">
                         <a:buFont typeface="Arial" panose="020B0604020202020204" pitchFamily="34" charset="0"/>
                         <a:buChar char="•"/>
                       </a:pPr>
@@ -24009,11 +25565,55 @@
                       </a:endParaRPr>
                     </a:p>
                     <a:p>
-                      <a:pPr marL="285750" lvl="0" indent="-285750">
+                      <a:pPr marL="800100" lvl="1" indent="-342900">
                         <a:buFont typeface="Arial" panose="020B0604020202020204" pitchFamily="34" charset="0"/>
                         <a:buChar char="•"/>
                       </a:pPr>
-                      <a:endParaRPr lang="ru-RU" dirty="0">
+                      <a:endParaRPr lang="en-US" dirty="0">
+                        <a:solidFill>
+                          <a:schemeClr val="tx1"/>
+                        </a:solidFill>
+                      </a:endParaRPr>
+                    </a:p>
+                    <a:p>
+                      <a:pPr marL="800100" lvl="1" indent="-342900">
+                        <a:buFont typeface="Arial" panose="020B0604020202020204" pitchFamily="34" charset="0"/>
+                        <a:buChar char="•"/>
+                      </a:pPr>
+                      <a:endParaRPr lang="en-US" dirty="0">
+                        <a:solidFill>
+                          <a:schemeClr val="tx1"/>
+                        </a:solidFill>
+                      </a:endParaRPr>
+                    </a:p>
+                    <a:p>
+                      <a:pPr marL="800100" lvl="1" indent="-342900">
+                        <a:buFont typeface="Arial" panose="020B0604020202020204" pitchFamily="34" charset="0"/>
+                        <a:buChar char="•"/>
+                      </a:pPr>
+                      <a:endParaRPr lang="en-US" dirty="0">
+                        <a:solidFill>
+                          <a:schemeClr val="tx1"/>
+                        </a:solidFill>
+                      </a:endParaRPr>
+                    </a:p>
+                    <a:p>
+                      <a:pPr marL="800100" lvl="1" indent="-342900">
+                        <a:buFont typeface="Arial" panose="020B0604020202020204" pitchFamily="34" charset="0"/>
+                        <a:buChar char="•"/>
+                      </a:pPr>
+                      <a:endParaRPr lang="en-US" dirty="0">
+                        <a:solidFill>
+                          <a:schemeClr val="tx1"/>
+                        </a:solidFill>
+                      </a:endParaRPr>
+                    </a:p>
+                    <a:p>
+                      <a:pPr marL="800100" lvl="1" indent="-342900">
+                        <a:buFont typeface="Arial" panose="020B0604020202020204" pitchFamily="34" charset="0"/>
+                        <a:buChar char="•"/>
+                      </a:pPr>
+                      <a:endParaRPr lang="en-US" dirty="0">
                         <a:solidFill>
                           <a:schemeClr val="tx1"/>
                         </a:solidFill>
@@ -24035,13 +25635,20 @@
     </p:spTree>
     <p:extLst>
       <p:ext uri="{BB962C8B-B14F-4D97-AF65-F5344CB8AC3E}">
-        <p14:creationId xmlns:p14="http://schemas.microsoft.com/office/powerpoint/2010/main" val="671948136"/>
+        <p14:creationId xmlns:p14="http://schemas.microsoft.com/office/powerpoint/2010/main" val="3571833104"/>
       </p:ext>
     </p:extLst>
   </p:cSld>
   <p:clrMapOvr>
     <a:masterClrMapping/>
   </p:clrMapOvr>
+  <p:timing>
+    <p:tnLst>
+      <p:par>
+        <p:cTn id="1" dur="indefinite" restart="never" nodeType="tmRoot"/>
+      </p:par>
+    </p:tnLst>
+  </p:timing>
 </p:sld>
 </file>
 
@@ -24469,6 +26076,13 @@
   <p:clrMapOvr>
     <a:masterClrMapping/>
   </p:clrMapOvr>
+  <p:timing>
+    <p:tnLst>
+      <p:par>
+        <p:cTn id="1" dur="indefinite" restart="never" nodeType="tmRoot"/>
+      </p:par>
+    </p:tnLst>
+  </p:timing>
 </p:sld>
 </file>
 
@@ -24613,7 +26227,7 @@
           <p:nvPr>
             <p:extLst>
               <p:ext uri="{D42A27DB-BD31-4B8C-83A1-F6EECF244321}">
-                <p14:modId xmlns:p14="http://schemas.microsoft.com/office/powerpoint/2010/main" val="2259084561"/>
+                <p14:modId xmlns:p14="http://schemas.microsoft.com/office/powerpoint/2010/main" val="1524602510"/>
               </p:ext>
             </p:extLst>
           </p:nvPr>
@@ -24825,18 +26439,10 @@
                       </a:endParaRPr>
                     </a:p>
                     <a:p>
-                      <a:pPr marL="0" lvl="0" indent="0">
+                      <a:pPr marL="285750" lvl="0" indent="-285750">
                         <a:buFont typeface="Arial" panose="020B0604020202020204" pitchFamily="34" charset="0"/>
-                        <a:buNone/>
+                        <a:buChar char="•"/>
                       </a:pPr>
-                      <a:r>
-                        <a:rPr lang="ru-RU" dirty="0">
-                          <a:solidFill>
-                            <a:schemeClr val="tx1"/>
-                          </a:solidFill>
-                        </a:rPr>
-                        <a:t>Объяснение:</a:t>
-                      </a:r>
                       <a:endParaRPr lang="en-US" dirty="0">
                         <a:solidFill>
                           <a:schemeClr val="tx1"/>
@@ -24844,62 +26450,70 @@
                       </a:endParaRPr>
                     </a:p>
                     <a:p>
-                      <a:pPr marL="342900" lvl="0" indent="-342900">
-                        <a:buFont typeface="+mj-lt"/>
-                        <a:buAutoNum type="arabicPeriod"/>
+                      <a:pPr marL="285750" lvl="0" indent="-285750">
+                        <a:buFont typeface="Arial" panose="020B0604020202020204" pitchFamily="34" charset="0"/>
+                        <a:buChar char="•"/>
                       </a:pPr>
-                      <a:r>
-                        <a:rPr lang="ru-RU" dirty="0">
-                          <a:solidFill>
-                            <a:schemeClr val="tx1"/>
-                          </a:solidFill>
-                        </a:rPr>
-                        <a:t>Файлы, которые редко изменяются (т.н. холодные данные), имеют тенденцию накапливаться в сегментах, которые заполнены лишь немного больше, чем до порога уборки мусора.</a:t>
-                      </a:r>
-                    </a:p>
-                    <a:p>
-                      <a:pPr marL="342900" lvl="0" indent="-342900">
-                        <a:buFont typeface="+mj-lt"/>
-                        <a:buAutoNum type="arabicPeriod"/>
+                      <a:endParaRPr lang="en-US" dirty="0">
+                        <a:solidFill>
+                          <a:schemeClr val="tx1"/>
+                        </a:solidFill>
+                      </a:endParaRPr>
+                    </a:p>
+                    <a:p>
+                      <a:pPr marL="285750" lvl="0" indent="-285750">
+                        <a:buFont typeface="Arial" panose="020B0604020202020204" pitchFamily="34" charset="0"/>
+                        <a:buChar char="•"/>
                       </a:pPr>
-                      <a:r>
-                        <a:rPr lang="ru-RU" dirty="0">
-                          <a:solidFill>
-                            <a:schemeClr val="tx1"/>
-                          </a:solidFill>
-                        </a:rPr>
-                        <a:t>Таких сегментов накапливается много и </a:t>
-                      </a:r>
-                      <a:r>
-                        <a:rPr lang="en-US" dirty="0">
-                          <a:solidFill>
-                            <a:schemeClr val="tx1"/>
-                          </a:solidFill>
-                        </a:rPr>
-                        <a:t>GC </a:t>
-                      </a:r>
-                      <a:r>
-                        <a:rPr lang="ru-RU" dirty="0">
-                          <a:solidFill>
-                            <a:schemeClr val="tx1"/>
-                          </a:solidFill>
-                        </a:rPr>
-                        <a:t>приходится их обрабатывать не тогда, когда в них будет достаточно мусора, а тогда, когда на всей ФС будет оставаться мало места.</a:t>
-                      </a:r>
-                    </a:p>
-                    <a:p>
-                      <a:pPr marL="342900" lvl="0" indent="-342900">
-                        <a:buFont typeface="+mj-lt"/>
-                        <a:buAutoNum type="arabicPeriod"/>
+                      <a:endParaRPr lang="en-US" dirty="0">
+                        <a:solidFill>
+                          <a:schemeClr val="tx1"/>
+                        </a:solidFill>
+                      </a:endParaRPr>
+                    </a:p>
+                    <a:p>
+                      <a:pPr marL="285750" lvl="0" indent="-285750">
+                        <a:buFont typeface="Arial" panose="020B0604020202020204" pitchFamily="34" charset="0"/>
+                        <a:buChar char="•"/>
                       </a:pPr>
-                      <a:r>
-                        <a:rPr lang="ru-RU" dirty="0">
-                          <a:solidFill>
-                            <a:schemeClr val="tx1"/>
-                          </a:solidFill>
-                        </a:rPr>
-                        <a:t>Новые сегменты с холодными данными снова будут подолгу подходить к порогу сборки мусора и их придётся очищать из-за исчерпания места на ФС, и т.д.</a:t>
-                      </a:r>
+                      <a:endParaRPr lang="en-US" dirty="0">
+                        <a:solidFill>
+                          <a:schemeClr val="tx1"/>
+                        </a:solidFill>
+                      </a:endParaRPr>
+                    </a:p>
+                    <a:p>
+                      <a:pPr marL="285750" lvl="0" indent="-285750">
+                        <a:buFont typeface="Arial" panose="020B0604020202020204" pitchFamily="34" charset="0"/>
+                        <a:buChar char="•"/>
+                      </a:pPr>
+                      <a:endParaRPr lang="en-US" dirty="0">
+                        <a:solidFill>
+                          <a:schemeClr val="tx1"/>
+                        </a:solidFill>
+                      </a:endParaRPr>
+                    </a:p>
+                    <a:p>
+                      <a:pPr marL="285750" lvl="0" indent="-285750">
+                        <a:buFont typeface="Arial" panose="020B0604020202020204" pitchFamily="34" charset="0"/>
+                        <a:buChar char="•"/>
+                      </a:pPr>
+                      <a:endParaRPr lang="en-US" dirty="0">
+                        <a:solidFill>
+                          <a:schemeClr val="tx1"/>
+                        </a:solidFill>
+                      </a:endParaRPr>
+                    </a:p>
+                    <a:p>
+                      <a:pPr marL="285750" lvl="0" indent="-285750">
+                        <a:buFont typeface="Arial" panose="020B0604020202020204" pitchFamily="34" charset="0"/>
+                        <a:buChar char="•"/>
+                      </a:pPr>
+                      <a:endParaRPr lang="ru-RU" dirty="0">
+                        <a:solidFill>
+                          <a:schemeClr val="tx1"/>
+                        </a:solidFill>
+                      </a:endParaRPr>
                     </a:p>
                   </a:txBody>
                   <a:tcPr/>
@@ -24917,13 +26531,20 @@
     </p:spTree>
     <p:extLst>
       <p:ext uri="{BB962C8B-B14F-4D97-AF65-F5344CB8AC3E}">
-        <p14:creationId xmlns:p14="http://schemas.microsoft.com/office/powerpoint/2010/main" val="748128758"/>
+        <p14:creationId xmlns:p14="http://schemas.microsoft.com/office/powerpoint/2010/main" val="671948136"/>
       </p:ext>
     </p:extLst>
   </p:cSld>
   <p:clrMapOvr>
     <a:masterClrMapping/>
   </p:clrMapOvr>
+  <p:timing>
+    <p:tnLst>
+      <p:par>
+        <p:cTn id="1" dur="indefinite" restart="never" nodeType="tmRoot"/>
+      </p:par>
+    </p:tnLst>
+  </p:timing>
 </p:sld>
 </file>
 
@@ -25068,7 +26689,7 @@
           <p:nvPr>
             <p:extLst>
               <p:ext uri="{D42A27DB-BD31-4B8C-83A1-F6EECF244321}">
-                <p14:modId xmlns:p14="http://schemas.microsoft.com/office/powerpoint/2010/main" val="2540261601"/>
+                <p14:modId xmlns:p14="http://schemas.microsoft.com/office/powerpoint/2010/main" val="2259084561"/>
               </p:ext>
             </p:extLst>
           </p:nvPr>
@@ -25209,6 +26830,468 @@
                             <a:schemeClr val="tx1"/>
                           </a:solidFill>
                         </a:rPr>
+                        <a:t>Наблюдение:</a:t>
+                      </a:r>
+                      <a:endParaRPr lang="en-US" dirty="0">
+                        <a:solidFill>
+                          <a:schemeClr val="tx1"/>
+                        </a:solidFill>
+                      </a:endParaRPr>
+                    </a:p>
+                    <a:p>
+                      <a:pPr marL="285750" lvl="0" indent="-285750">
+                        <a:buFont typeface="Arial" panose="020B0604020202020204" pitchFamily="34" charset="0"/>
+                        <a:buChar char="•"/>
+                      </a:pPr>
+                      <a:r>
+                        <a:rPr lang="ru-RU" dirty="0">
+                          <a:solidFill>
+                            <a:schemeClr val="tx1"/>
+                          </a:solidFill>
+                        </a:rPr>
+                        <a:t>Если просто объединять сегменты, в которых оказалось много незанятого места (например, </a:t>
+                      </a:r>
+                      <a:r>
+                        <a:rPr lang="en-US" dirty="0">
+                          <a:solidFill>
+                            <a:schemeClr val="tx1"/>
+                          </a:solidFill>
+                        </a:rPr>
+                        <a:t>&gt;= 50%)</a:t>
+                      </a:r>
+                      <a:r>
+                        <a:rPr lang="ru-RU" dirty="0">
+                          <a:solidFill>
+                            <a:schemeClr val="tx1"/>
+                          </a:solidFill>
+                        </a:rPr>
+                        <a:t>, в один, то мы получаем большой </a:t>
+                      </a:r>
+                      <a:r>
+                        <a:rPr lang="en-US" dirty="0">
+                          <a:solidFill>
+                            <a:schemeClr val="tx1"/>
+                          </a:solidFill>
+                        </a:rPr>
+                        <a:t>write amplification: </a:t>
+                      </a:r>
+                      <a:r>
+                        <a:rPr lang="ru-RU" dirty="0">
+                          <a:solidFill>
+                            <a:schemeClr val="tx1"/>
+                          </a:solidFill>
+                        </a:rPr>
+                        <a:t>одни и те же данные приходится копировать во многих циклах сборки мусора.</a:t>
+                      </a:r>
+                      <a:endParaRPr lang="en-US" dirty="0">
+                        <a:solidFill>
+                          <a:schemeClr val="tx1"/>
+                        </a:solidFill>
+                      </a:endParaRPr>
+                    </a:p>
+                    <a:p>
+                      <a:pPr marL="285750" lvl="0" indent="-285750">
+                        <a:buFont typeface="Arial" panose="020B0604020202020204" pitchFamily="34" charset="0"/>
+                        <a:buChar char="•"/>
+                      </a:pPr>
+                      <a:endParaRPr lang="en-US" dirty="0">
+                        <a:solidFill>
+                          <a:schemeClr val="tx1"/>
+                        </a:solidFill>
+                      </a:endParaRPr>
+                    </a:p>
+                    <a:p>
+                      <a:pPr marL="0" lvl="0" indent="0">
+                        <a:buFont typeface="Arial" panose="020B0604020202020204" pitchFamily="34" charset="0"/>
+                        <a:buNone/>
+                      </a:pPr>
+                      <a:r>
+                        <a:rPr lang="ru-RU" dirty="0">
+                          <a:solidFill>
+                            <a:schemeClr val="tx1"/>
+                          </a:solidFill>
+                        </a:rPr>
+                        <a:t>Объяснение:</a:t>
+                      </a:r>
+                      <a:endParaRPr lang="en-US" dirty="0">
+                        <a:solidFill>
+                          <a:schemeClr val="tx1"/>
+                        </a:solidFill>
+                      </a:endParaRPr>
+                    </a:p>
+                    <a:p>
+                      <a:pPr marL="342900" lvl="0" indent="-342900">
+                        <a:buFont typeface="+mj-lt"/>
+                        <a:buAutoNum type="arabicPeriod"/>
+                      </a:pPr>
+                      <a:r>
+                        <a:rPr lang="ru-RU" dirty="0">
+                          <a:solidFill>
+                            <a:schemeClr val="tx1"/>
+                          </a:solidFill>
+                        </a:rPr>
+                        <a:t>Файлы, которые редко изменяются (т.н. холодные данные), имеют тенденцию накапливаться в сегментах, которые заполнены лишь немного больше, чем до порога уборки мусора.</a:t>
+                      </a:r>
+                    </a:p>
+                    <a:p>
+                      <a:pPr marL="342900" lvl="0" indent="-342900">
+                        <a:buFont typeface="+mj-lt"/>
+                        <a:buAutoNum type="arabicPeriod"/>
+                      </a:pPr>
+                      <a:r>
+                        <a:rPr lang="ru-RU" dirty="0">
+                          <a:solidFill>
+                            <a:schemeClr val="tx1"/>
+                          </a:solidFill>
+                        </a:rPr>
+                        <a:t>Таких сегментов накапливается много и </a:t>
+                      </a:r>
+                      <a:r>
+                        <a:rPr lang="en-US" dirty="0">
+                          <a:solidFill>
+                            <a:schemeClr val="tx1"/>
+                          </a:solidFill>
+                        </a:rPr>
+                        <a:t>GC </a:t>
+                      </a:r>
+                      <a:r>
+                        <a:rPr lang="ru-RU" dirty="0">
+                          <a:solidFill>
+                            <a:schemeClr val="tx1"/>
+                          </a:solidFill>
+                        </a:rPr>
+                        <a:t>приходится их обрабатывать не тогда, когда в них будет достаточно мусора, а тогда, когда на всей ФС будет оставаться мало места.</a:t>
+                      </a:r>
+                    </a:p>
+                    <a:p>
+                      <a:pPr marL="342900" lvl="0" indent="-342900">
+                        <a:buFont typeface="+mj-lt"/>
+                        <a:buAutoNum type="arabicPeriod"/>
+                      </a:pPr>
+                      <a:r>
+                        <a:rPr lang="ru-RU" dirty="0">
+                          <a:solidFill>
+                            <a:schemeClr val="tx1"/>
+                          </a:solidFill>
+                        </a:rPr>
+                        <a:t>Новые сегменты с холодными данными снова будут подолгу подходить к порогу сборки мусора и их придётся очищать из-за исчерпания места на ФС, и т.д.</a:t>
+                      </a:r>
+                    </a:p>
+                  </a:txBody>
+                  <a:tcPr/>
+                </a:tc>
+                <a:extLst>
+                  <a:ext uri="{0D108BD9-81ED-4DB2-BD59-A6C34878D82A}">
+                    <a16:rowId xmlns:a16="http://schemas.microsoft.com/office/drawing/2014/main" val="10001"/>
+                  </a:ext>
+                </a:extLst>
+              </a:tr>
+            </a:tbl>
+          </a:graphicData>
+        </a:graphic>
+      </p:graphicFrame>
+    </p:spTree>
+    <p:extLst>
+      <p:ext uri="{BB962C8B-B14F-4D97-AF65-F5344CB8AC3E}">
+        <p14:creationId xmlns:p14="http://schemas.microsoft.com/office/powerpoint/2010/main" val="748128758"/>
+      </p:ext>
+    </p:extLst>
+  </p:cSld>
+  <p:clrMapOvr>
+    <a:masterClrMapping/>
+  </p:clrMapOvr>
+  <p:timing>
+    <p:tnLst>
+      <p:par>
+        <p:cTn id="1" dur="indefinite" restart="never" nodeType="tmRoot"/>
+      </p:par>
+    </p:tnLst>
+  </p:timing>
+</p:sld>
+</file>
+
+<file path=ppt/slides/slide32.xml><?xml version="1.0" encoding="utf-8"?>
+<p:sld xmlns:a="http://schemas.openxmlformats.org/drawingml/2006/main" xmlns:r="http://schemas.openxmlformats.org/officeDocument/2006/relationships" xmlns:p="http://schemas.openxmlformats.org/presentationml/2006/main">
+  <p:cSld>
+    <p:spTree>
+      <p:nvGrpSpPr>
+        <p:cNvPr id="1" name=""/>
+        <p:cNvGrpSpPr/>
+        <p:nvPr/>
+      </p:nvGrpSpPr>
+      <p:grpSpPr>
+        <a:xfrm>
+          <a:off x="0" y="0"/>
+          <a:ext cx="0" cy="0"/>
+          <a:chOff x="0" y="0"/>
+          <a:chExt cx="0" cy="0"/>
+        </a:xfrm>
+      </p:grpSpPr>
+      <p:graphicFrame>
+        <p:nvGraphicFramePr>
+          <p:cNvPr id="5" name="Table 4"/>
+          <p:cNvGraphicFramePr>
+            <a:graphicFrameLocks noGrp="1"/>
+          </p:cNvGraphicFramePr>
+          <p:nvPr>
+            <p:extLst/>
+          </p:nvPr>
+        </p:nvGraphicFramePr>
+        <p:xfrm>
+          <a:off x="0" y="1"/>
+          <a:ext cx="12192000" cy="365760"/>
+        </p:xfrm>
+        <a:graphic>
+          <a:graphicData uri="http://schemas.openxmlformats.org/drawingml/2006/table">
+            <a:tbl>
+              <a:tblPr firstRow="1" bandRow="1">
+                <a:tableStyleId>{5C22544A-7EE6-4342-B048-85BDC9FD1C3A}</a:tableStyleId>
+              </a:tblPr>
+              <a:tblGrid>
+                <a:gridCol w="12192000">
+                  <a:extLst>
+                    <a:ext uri="{9D8B030D-6E8A-4147-A177-3AD203B41FA5}">
+                      <a16:colId xmlns:a16="http://schemas.microsoft.com/office/drawing/2014/main" val="20000"/>
+                    </a:ext>
+                  </a:extLst>
+                </a:gridCol>
+              </a:tblGrid>
+              <a:tr h="321276">
+                <a:tc>
+                  <a:txBody>
+                    <a:bodyPr/>
+                    <a:lstStyle/>
+                    <a:p>
+                      <a:r>
+                        <a:rPr lang="ru-RU" dirty="0"/>
+                        <a:t>Основы</a:t>
+                      </a:r>
+                      <a:r>
+                        <a:rPr lang="ru-RU" baseline="0" dirty="0"/>
+                        <a:t> построения файловых систем</a:t>
+                      </a:r>
+                      <a:endParaRPr lang="ru-RU" dirty="0"/>
+                    </a:p>
+                  </a:txBody>
+                  <a:tcPr/>
+                </a:tc>
+                <a:extLst>
+                  <a:ext uri="{0D108BD9-81ED-4DB2-BD59-A6C34878D82A}">
+                    <a16:rowId xmlns:a16="http://schemas.microsoft.com/office/drawing/2014/main" val="10000"/>
+                  </a:ext>
+                </a:extLst>
+              </a:tr>
+            </a:tbl>
+          </a:graphicData>
+        </a:graphic>
+      </p:graphicFrame>
+      <p:graphicFrame>
+        <p:nvGraphicFramePr>
+          <p:cNvPr id="6" name="Table 5"/>
+          <p:cNvGraphicFramePr>
+            <a:graphicFrameLocks noGrp="1"/>
+          </p:cNvGraphicFramePr>
+          <p:nvPr>
+            <p:extLst/>
+          </p:nvPr>
+        </p:nvGraphicFramePr>
+        <p:xfrm>
+          <a:off x="0" y="6532604"/>
+          <a:ext cx="12192000" cy="365760"/>
+        </p:xfrm>
+        <a:graphic>
+          <a:graphicData uri="http://schemas.openxmlformats.org/drawingml/2006/table">
+            <a:tbl>
+              <a:tblPr firstRow="1" bandRow="1">
+                <a:tableStyleId>{5C22544A-7EE6-4342-B048-85BDC9FD1C3A}</a:tableStyleId>
+              </a:tblPr>
+              <a:tblGrid>
+                <a:gridCol w="12192000">
+                  <a:extLst>
+                    <a:ext uri="{9D8B030D-6E8A-4147-A177-3AD203B41FA5}">
+                      <a16:colId xmlns:a16="http://schemas.microsoft.com/office/drawing/2014/main" val="20000"/>
+                    </a:ext>
+                  </a:extLst>
+                </a:gridCol>
+              </a:tblGrid>
+              <a:tr h="308094">
+                <a:tc>
+                  <a:txBody>
+                    <a:bodyPr/>
+                    <a:lstStyle/>
+                    <a:p>
+                      <a:r>
+                        <a:rPr lang="en-US" dirty="0"/>
+                        <a:t>Acronis @ </a:t>
+                      </a:r>
+                      <a:r>
+                        <a:rPr lang="ru-RU" dirty="0"/>
+                        <a:t>МФТИ</a:t>
+                      </a:r>
+                    </a:p>
+                  </a:txBody>
+                  <a:tcPr/>
+                </a:tc>
+                <a:extLst>
+                  <a:ext uri="{0D108BD9-81ED-4DB2-BD59-A6C34878D82A}">
+                    <a16:rowId xmlns:a16="http://schemas.microsoft.com/office/drawing/2014/main" val="10000"/>
+                  </a:ext>
+                </a:extLst>
+              </a:tr>
+            </a:tbl>
+          </a:graphicData>
+        </a:graphic>
+      </p:graphicFrame>
+      <p:graphicFrame>
+        <p:nvGraphicFramePr>
+          <p:cNvPr id="2" name="Table 1"/>
+          <p:cNvGraphicFramePr>
+            <a:graphicFrameLocks noGrp="1"/>
+          </p:cNvGraphicFramePr>
+          <p:nvPr>
+            <p:extLst>
+              <p:ext uri="{D42A27DB-BD31-4B8C-83A1-F6EECF244321}">
+                <p14:modId xmlns:p14="http://schemas.microsoft.com/office/powerpoint/2010/main" val="2540261601"/>
+              </p:ext>
+            </p:extLst>
+          </p:nvPr>
+        </p:nvGraphicFramePr>
+        <p:xfrm>
+          <a:off x="0" y="365760"/>
+          <a:ext cx="12192000" cy="5212080"/>
+        </p:xfrm>
+        <a:graphic>
+          <a:graphicData uri="http://schemas.openxmlformats.org/drawingml/2006/table">
+            <a:tbl>
+              <a:tblPr firstRow="1" bandRow="1">
+                <a:tableStyleId>{3B4B98B0-60AC-42C2-AFA5-B58CD77FA1E5}</a:tableStyleId>
+              </a:tblPr>
+              <a:tblGrid>
+                <a:gridCol w="12192000">
+                  <a:extLst>
+                    <a:ext uri="{9D8B030D-6E8A-4147-A177-3AD203B41FA5}">
+                      <a16:colId xmlns:a16="http://schemas.microsoft.com/office/drawing/2014/main" val="20000"/>
+                    </a:ext>
+                  </a:extLst>
+                </a:gridCol>
+              </a:tblGrid>
+              <a:tr h="174670">
+                <a:tc>
+                  <a:txBody>
+                    <a:bodyPr/>
+                    <a:lstStyle/>
+                    <a:p>
+                      <a:r>
+                        <a:rPr lang="ru-RU" sz="2400" dirty="0"/>
+                        <a:t>Стратегии сбора мусора</a:t>
+                      </a:r>
+                    </a:p>
+                  </a:txBody>
+                  <a:tcPr/>
+                </a:tc>
+                <a:extLst>
+                  <a:ext uri="{0D108BD9-81ED-4DB2-BD59-A6C34878D82A}">
+                    <a16:rowId xmlns:a16="http://schemas.microsoft.com/office/drawing/2014/main" val="10000"/>
+                  </a:ext>
+                </a:extLst>
+              </a:tr>
+              <a:tr h="141677">
+                <a:tc>
+                  <a:txBody>
+                    <a:bodyPr/>
+                    <a:lstStyle/>
+                    <a:p>
+                      <a:pPr marL="342900" indent="-342900">
+                        <a:buFont typeface="+mj-lt"/>
+                        <a:buAutoNum type="arabicPeriod"/>
+                      </a:pPr>
+                      <a:r>
+                        <a:rPr lang="ru-RU" dirty="0">
+                          <a:solidFill>
+                            <a:schemeClr val="tx1"/>
+                          </a:solidFill>
+                        </a:rPr>
+                        <a:t>Как выбирать сегменты, в которых собрать мусор?</a:t>
+                      </a:r>
+                    </a:p>
+                    <a:p>
+                      <a:pPr marL="742950" lvl="1" indent="-285750">
+                        <a:buFont typeface="Arial" panose="020B0604020202020204" pitchFamily="34" charset="0"/>
+                        <a:buChar char="•"/>
+                      </a:pPr>
+                      <a:r>
+                        <a:rPr lang="ru-RU" dirty="0">
+                          <a:solidFill>
+                            <a:schemeClr val="tx1"/>
+                          </a:solidFill>
+                        </a:rPr>
+                        <a:t>убирать мусор из тех сегментов, где его больше всего,</a:t>
+                      </a:r>
+                    </a:p>
+                    <a:p>
+                      <a:pPr marL="742950" lvl="1" indent="-285750">
+                        <a:buFont typeface="Arial" panose="020B0604020202020204" pitchFamily="34" charset="0"/>
+                        <a:buChar char="•"/>
+                      </a:pPr>
+                      <a:r>
+                        <a:rPr lang="ru-RU" dirty="0">
+                          <a:solidFill>
+                            <a:schemeClr val="tx1"/>
+                          </a:solidFill>
+                        </a:rPr>
+                        <a:t>убирать мусор из наиболее фрагментированных сегментов.</a:t>
+                      </a:r>
+                    </a:p>
+                    <a:p>
+                      <a:pPr marL="342900" indent="-342900">
+                        <a:buFont typeface="+mj-lt"/>
+                        <a:buAutoNum type="arabicPeriod"/>
+                      </a:pPr>
+                      <a:r>
+                        <a:rPr lang="ru-RU" dirty="0">
+                          <a:solidFill>
+                            <a:schemeClr val="tx1"/>
+                          </a:solidFill>
+                        </a:rPr>
+                        <a:t>Как перегруппировывать данные из сегментов?</a:t>
+                      </a:r>
+                    </a:p>
+                    <a:p>
+                      <a:pPr marL="800100" lvl="1" indent="-342900">
+                        <a:buFont typeface="Arial" panose="020B0604020202020204" pitchFamily="34" charset="0"/>
+                        <a:buChar char="•"/>
+                      </a:pPr>
+                      <a:r>
+                        <a:rPr lang="ru-RU" dirty="0">
+                          <a:solidFill>
+                            <a:schemeClr val="tx1"/>
+                          </a:solidFill>
+                        </a:rPr>
+                        <a:t>хватит ли просто сливать несколько фрагментированных сегментов в один?</a:t>
+                      </a:r>
+                    </a:p>
+                    <a:p>
+                      <a:pPr marL="800100" lvl="1" indent="-342900">
+                        <a:buFont typeface="Arial" panose="020B0604020202020204" pitchFamily="34" charset="0"/>
+                        <a:buChar char="•"/>
+                      </a:pPr>
+                      <a:endParaRPr lang="ru-RU" dirty="0">
+                        <a:solidFill>
+                          <a:schemeClr val="tx1"/>
+                        </a:solidFill>
+                      </a:endParaRPr>
+                    </a:p>
+                    <a:p>
+                      <a:pPr marL="0" lvl="0" indent="0">
+                        <a:buFont typeface="Arial" panose="020B0604020202020204" pitchFamily="34" charset="0"/>
+                        <a:buNone/>
+                      </a:pPr>
+                      <a:r>
+                        <a:rPr lang="ru-RU" dirty="0">
+                          <a:solidFill>
+                            <a:schemeClr val="tx1"/>
+                          </a:solidFill>
+                        </a:rPr>
                         <a:t>Идея (</a:t>
                       </a:r>
                       <a:r>
@@ -25373,6 +27456,13 @@
   <p:clrMapOvr>
     <a:masterClrMapping/>
   </p:clrMapOvr>
+  <p:timing>
+    <p:tnLst>
+      <p:par>
+        <p:cTn id="1" dur="indefinite" restart="never" nodeType="tmRoot"/>
+      </p:par>
+    </p:tnLst>
+  </p:timing>
 </p:sld>
 </file>
 
@@ -25897,7 +27987,11 @@
             <a:graphicFrameLocks noGrp="1"/>
           </p:cNvGraphicFramePr>
           <p:nvPr>
-            <p:extLst/>
+            <p:extLst>
+              <p:ext uri="{D42A27DB-BD31-4B8C-83A1-F6EECF244321}">
+                <p14:modId xmlns:p14="http://schemas.microsoft.com/office/powerpoint/2010/main" val="2146096113"/>
+              </p:ext>
+            </p:extLst>
           </p:nvPr>
         </p:nvGraphicFramePr>
         <p:xfrm>
@@ -26010,9 +28104,7 @@
                     </a:p>
                   </a:txBody>
                   <a:tcPr>
-                    <a:solidFill>
-                      <a:srgbClr val="00B050"/>
-                    </a:solidFill>
+                    <a:noFill/>
                   </a:tcPr>
                 </a:tc>
                 <a:tc>
@@ -26024,6 +28116,10 @@
                         <a:rPr lang="en-US" dirty="0" err="1"/>
                         <a:t>Inode</a:t>
                       </a:r>
+                      <a:r>
+                        <a:rPr lang="en-US" dirty="0"/>
+                        <a:t/>
+                      </a:r>
                       <a:br>
                         <a:rPr lang="en-US" dirty="0"/>
                       </a:br>
@@ -26034,7 +28130,11 @@
                       <a:endParaRPr lang="ru-RU" dirty="0"/>
                     </a:p>
                   </a:txBody>
-                  <a:tcPr/>
+                  <a:tcPr>
+                    <a:solidFill>
+                      <a:srgbClr val="00B050"/>
+                    </a:solidFill>
+                  </a:tcPr>
                 </a:tc>
                 <a:tc>
                   <a:txBody>
@@ -26259,6 +28359,13 @@
   <p:clrMapOvr>
     <a:masterClrMapping/>
   </p:clrMapOvr>
+  <p:timing>
+    <p:tnLst>
+      <p:par>
+        <p:cTn id="1" dur="indefinite" restart="never" nodeType="tmRoot"/>
+      </p:par>
+    </p:tnLst>
+  </p:timing>
 </p:sld>
 </file>
 
@@ -26771,7 +28878,11 @@
             <a:graphicFrameLocks noGrp="1"/>
           </p:cNvGraphicFramePr>
           <p:nvPr>
-            <p:extLst/>
+            <p:extLst>
+              <p:ext uri="{D42A27DB-BD31-4B8C-83A1-F6EECF244321}">
+                <p14:modId xmlns:p14="http://schemas.microsoft.com/office/powerpoint/2010/main" val="1537299907"/>
+              </p:ext>
+            </p:extLst>
           </p:nvPr>
         </p:nvGraphicFramePr>
         <p:xfrm>
@@ -26883,7 +28994,11 @@
                       <a:endParaRPr lang="ru-RU" dirty="0"/>
                     </a:p>
                   </a:txBody>
-                  <a:tcPr/>
+                  <a:tcPr>
+                    <a:solidFill>
+                      <a:srgbClr val="00B050"/>
+                    </a:solidFill>
+                  </a:tcPr>
                 </a:tc>
                 <a:tc>
                   <a:txBody>
@@ -26894,6 +29009,10 @@
                         <a:rPr lang="en-US" dirty="0" err="1"/>
                         <a:t>Inode</a:t>
                       </a:r>
+                      <a:r>
+                        <a:rPr lang="en-US" dirty="0"/>
+                        <a:t/>
+                      </a:r>
                       <a:br>
                         <a:rPr lang="en-US" dirty="0"/>
                       </a:br>
@@ -26905,9 +29024,7 @@
                     </a:p>
                   </a:txBody>
                   <a:tcPr>
-                    <a:solidFill>
-                      <a:srgbClr val="00B050"/>
-                    </a:solidFill>
+                    <a:noFill/>
                   </a:tcPr>
                 </a:tc>
                 <a:tc>
@@ -27133,6 +29250,13 @@
   <p:clrMapOvr>
     <a:masterClrMapping/>
   </p:clrMapOvr>
+  <p:timing>
+    <p:tnLst>
+      <p:par>
+        <p:cTn id="1" dur="indefinite" restart="never" nodeType="tmRoot"/>
+      </p:par>
+    </p:tnLst>
+  </p:timing>
 </p:sld>
 </file>
 
@@ -27788,6 +29912,10 @@
                         <a:rPr lang="en-US" dirty="0" err="1"/>
                         <a:t>Inode</a:t>
                       </a:r>
+                      <a:r>
+                        <a:rPr lang="en-US" dirty="0"/>
+                        <a:t/>
+                      </a:r>
                       <a:br>
                         <a:rPr lang="en-US" dirty="0"/>
                       </a:br>
@@ -28027,6 +30155,13 @@
   <p:clrMapOvr>
     <a:masterClrMapping/>
   </p:clrMapOvr>
+  <p:timing>
+    <p:tnLst>
+      <p:par>
+        <p:cTn id="1" dur="indefinite" restart="never" nodeType="tmRoot"/>
+      </p:par>
+    </p:tnLst>
+  </p:timing>
 </p:sld>
 </file>
 
@@ -28674,6 +30809,10 @@
                         <a:rPr lang="en-US" dirty="0" err="1"/>
                         <a:t>Inode</a:t>
                       </a:r>
+                      <a:r>
+                        <a:rPr lang="en-US" dirty="0"/>
+                        <a:t/>
+                      </a:r>
                       <a:br>
                         <a:rPr lang="en-US" dirty="0"/>
                       </a:br>
@@ -28913,6 +31052,13 @@
   <p:clrMapOvr>
     <a:masterClrMapping/>
   </p:clrMapOvr>
+  <p:timing>
+    <p:tnLst>
+      <p:par>
+        <p:cTn id="1" dur="indefinite" restart="never" nodeType="tmRoot"/>
+      </p:par>
+    </p:tnLst>
+  </p:timing>
 </p:sld>
 </file>
 
@@ -29556,6 +31702,10 @@
                         <a:rPr lang="en-US" dirty="0" err="1"/>
                         <a:t>Inode</a:t>
                       </a:r>
+                      <a:r>
+                        <a:rPr lang="en-US" dirty="0"/>
+                        <a:t/>
+                      </a:r>
                       <a:br>
                         <a:rPr lang="en-US" dirty="0"/>
                       </a:br>
@@ -29845,6 +31995,13 @@
   <p:clrMapOvr>
     <a:masterClrMapping/>
   </p:clrMapOvr>
+  <p:timing>
+    <p:tnLst>
+      <p:par>
+        <p:cTn id="1" dur="indefinite" restart="never" nodeType="tmRoot"/>
+      </p:par>
+    </p:tnLst>
+  </p:timing>
 </p:sld>
 </file>
 
@@ -30488,6 +32645,10 @@
                         <a:rPr lang="en-US" dirty="0" err="1"/>
                         <a:t>Inode</a:t>
                       </a:r>
+                      <a:r>
+                        <a:rPr lang="en-US" dirty="0"/>
+                        <a:t/>
+                      </a:r>
                       <a:br>
                         <a:rPr lang="en-US" dirty="0"/>
                       </a:br>
@@ -30727,6 +32888,13 @@
   <p:clrMapOvr>
     <a:masterClrMapping/>
   </p:clrMapOvr>
+  <p:timing>
+    <p:tnLst>
+      <p:par>
+        <p:cTn id="1" dur="indefinite" restart="never" nodeType="tmRoot"/>
+      </p:par>
+    </p:tnLst>
+  </p:timing>
 </p:sld>
 </file>
 

</xml_diff>